<commit_message>
Updates to part 4
</commit_message>
<xml_diff>
--- a/slides/advanced_part4.pptx
+++ b/slides/advanced_part4.pptx
@@ -5,7 +5,7 @@
     <p:sldMasterId id="2147483648" r:id="rId1"/>
   </p:sldMasterIdLst>
   <p:notesMasterIdLst>
-    <p:notesMasterId r:id="rId14"/>
+    <p:notesMasterId r:id="rId15"/>
   </p:notesMasterIdLst>
   <p:sldIdLst>
     <p:sldId id="257" r:id="rId2"/>
@@ -18,8 +18,9 @@
     <p:sldId id="264" r:id="rId9"/>
     <p:sldId id="265" r:id="rId10"/>
     <p:sldId id="266" r:id="rId11"/>
-    <p:sldId id="267" r:id="rId12"/>
-    <p:sldId id="268" r:id="rId13"/>
+    <p:sldId id="269" r:id="rId12"/>
+    <p:sldId id="267" r:id="rId13"/>
+    <p:sldId id="268" r:id="rId14"/>
   </p:sldIdLst>
   <p:sldSz cx="9144000" cy="6858000" type="screen4x3"/>
   <p:notesSz cx="6858000" cy="9144000"/>
@@ -203,7 +204,7 @@
           <a:p>
             <a:fld id="{2E256997-BFE9-1645-ACA2-FB0069B34735}" type="datetimeFigureOut">
               <a:rPr lang="en-US" smtClean="0"/>
-              <a:t>05/05/15</a:t>
+              <a:t>06/05/15</a:t>
             </a:fld>
             <a:endParaRPr lang="en-GB"/>
           </a:p>
@@ -537,7 +538,7 @@
             <a:fld id="{9B3F2D69-97A9-4C41-91BD-6A22F8270148}" type="slidenum">
               <a:rPr lang="en-GB" smtClean="0"/>
               <a:pPr/>
-              <a:t>11</a:t>
+              <a:t>12</a:t>
             </a:fld>
             <a:endParaRPr lang="en-GB"/>
           </a:p>
@@ -737,7 +738,7 @@
           <a:p>
             <a:fld id="{63635F44-C3D0-2B4D-8E09-42DBC0FC5507}" type="datetimeFigureOut">
               <a:rPr lang="en-US" smtClean="0"/>
-              <a:t>05/05/15</a:t>
+              <a:t>06/05/15</a:t>
             </a:fld>
             <a:endParaRPr lang="en-GB"/>
           </a:p>
@@ -907,7 +908,7 @@
           <a:p>
             <a:fld id="{63635F44-C3D0-2B4D-8E09-42DBC0FC5507}" type="datetimeFigureOut">
               <a:rPr lang="en-US" smtClean="0"/>
-              <a:t>05/05/15</a:t>
+              <a:t>06/05/15</a:t>
             </a:fld>
             <a:endParaRPr lang="en-GB"/>
           </a:p>
@@ -1087,7 +1088,7 @@
           <a:p>
             <a:fld id="{63635F44-C3D0-2B4D-8E09-42DBC0FC5507}" type="datetimeFigureOut">
               <a:rPr lang="en-US" smtClean="0"/>
-              <a:t>05/05/15</a:t>
+              <a:t>06/05/15</a:t>
             </a:fld>
             <a:endParaRPr lang="en-GB"/>
           </a:p>
@@ -1257,7 +1258,7 @@
           <a:p>
             <a:fld id="{63635F44-C3D0-2B4D-8E09-42DBC0FC5507}" type="datetimeFigureOut">
               <a:rPr lang="en-US" smtClean="0"/>
-              <a:t>05/05/15</a:t>
+              <a:t>06/05/15</a:t>
             </a:fld>
             <a:endParaRPr lang="en-GB"/>
           </a:p>
@@ -1503,7 +1504,7 @@
           <a:p>
             <a:fld id="{63635F44-C3D0-2B4D-8E09-42DBC0FC5507}" type="datetimeFigureOut">
               <a:rPr lang="en-US" smtClean="0"/>
-              <a:t>05/05/15</a:t>
+              <a:t>06/05/15</a:t>
             </a:fld>
             <a:endParaRPr lang="en-GB"/>
           </a:p>
@@ -1791,7 +1792,7 @@
           <a:p>
             <a:fld id="{63635F44-C3D0-2B4D-8E09-42DBC0FC5507}" type="datetimeFigureOut">
               <a:rPr lang="en-US" smtClean="0"/>
-              <a:t>05/05/15</a:t>
+              <a:t>06/05/15</a:t>
             </a:fld>
             <a:endParaRPr lang="en-GB"/>
           </a:p>
@@ -2213,7 +2214,7 @@
           <a:p>
             <a:fld id="{63635F44-C3D0-2B4D-8E09-42DBC0FC5507}" type="datetimeFigureOut">
               <a:rPr lang="en-US" smtClean="0"/>
-              <a:t>05/05/15</a:t>
+              <a:t>06/05/15</a:t>
             </a:fld>
             <a:endParaRPr lang="en-GB"/>
           </a:p>
@@ -2331,7 +2332,7 @@
           <a:p>
             <a:fld id="{63635F44-C3D0-2B4D-8E09-42DBC0FC5507}" type="datetimeFigureOut">
               <a:rPr lang="en-US" smtClean="0"/>
-              <a:t>05/05/15</a:t>
+              <a:t>06/05/15</a:t>
             </a:fld>
             <a:endParaRPr lang="en-GB"/>
           </a:p>
@@ -2426,7 +2427,7 @@
           <a:p>
             <a:fld id="{63635F44-C3D0-2B4D-8E09-42DBC0FC5507}" type="datetimeFigureOut">
               <a:rPr lang="en-US" smtClean="0"/>
-              <a:t>05/05/15</a:t>
+              <a:t>06/05/15</a:t>
             </a:fld>
             <a:endParaRPr lang="en-GB"/>
           </a:p>
@@ -2703,7 +2704,7 @@
           <a:p>
             <a:fld id="{63635F44-C3D0-2B4D-8E09-42DBC0FC5507}" type="datetimeFigureOut">
               <a:rPr lang="en-US" smtClean="0"/>
-              <a:t>05/05/15</a:t>
+              <a:t>06/05/15</a:t>
             </a:fld>
             <a:endParaRPr lang="en-GB"/>
           </a:p>
@@ -2956,7 +2957,7 @@
           <a:p>
             <a:fld id="{63635F44-C3D0-2B4D-8E09-42DBC0FC5507}" type="datetimeFigureOut">
               <a:rPr lang="en-US" smtClean="0"/>
-              <a:t>05/05/15</a:t>
+              <a:t>06/05/15</a:t>
             </a:fld>
             <a:endParaRPr lang="en-GB"/>
           </a:p>
@@ -3169,7 +3170,7 @@
           <a:p>
             <a:fld id="{63635F44-C3D0-2B4D-8E09-42DBC0FC5507}" type="datetimeFigureOut">
               <a:rPr lang="en-US" smtClean="0"/>
-              <a:t>05/05/15</a:t>
+              <a:t>06/05/15</a:t>
             </a:fld>
             <a:endParaRPr lang="en-GB"/>
           </a:p>
@@ -3563,14 +3564,29 @@
           <a:p>
             <a:r>
               <a:rPr lang="en-GB" dirty="0" smtClean="0"/>
-              <a:t>Advanced OpenCL Topics - OPENCL / OpenGL </a:t>
+              <a:t>Advanced OpenCL Topics </a:t>
+            </a:r>
+            <a:r>
+              <a:rPr lang="en-GB" dirty="0" smtClean="0"/>
+              <a:t>–</a:t>
+            </a:r>
+            <a:br>
+              <a:rPr lang="en-GB" dirty="0" smtClean="0"/>
+            </a:br>
+            <a:r>
+              <a:rPr lang="en-GB" dirty="0" smtClean="0"/>
+              <a:t>OPENCL </a:t>
+            </a:r>
+            <a:r>
+              <a:rPr lang="en-GB" dirty="0" smtClean="0"/>
+              <a:t>/ OpenGL </a:t>
             </a:r>
             <a:r>
               <a:rPr lang="en-GB" dirty="0" err="1" smtClean="0"/>
               <a:t>interop</a:t>
             </a:r>
             <a:r>
-              <a:rPr lang="en-GB" smtClean="0"/>
+              <a:rPr lang="en-GB" dirty="0" smtClean="0"/>
               <a:t>.</a:t>
             </a:r>
             <a:r>
@@ -3600,20 +3616,12 @@
           <a:lstStyle/>
           <a:p>
             <a:r>
-              <a:rPr lang="en-GB">
+              <a:rPr lang="en-GB" dirty="0" smtClean="0">
                 <a:solidFill>
                   <a:schemeClr val="tx1"/>
                 </a:solidFill>
               </a:rPr>
-              <a:t>Lecture </a:t>
-            </a:r>
-            <a:r>
-              <a:rPr lang="en-GB" smtClean="0">
-                <a:solidFill>
-                  <a:schemeClr val="tx1"/>
-                </a:solidFill>
-              </a:rPr>
-              <a:t>13</a:t>
+              <a:t>Part 4</a:t>
             </a:r>
             <a:endParaRPr lang="en-GB" dirty="0">
               <a:solidFill>
@@ -3695,8 +3703,8 @@
         </p:nvSpPr>
         <p:spPr>
           <a:xfrm>
-            <a:off x="323528" y="1435100"/>
-            <a:ext cx="3384376" cy="4691063"/>
+            <a:off x="236482" y="1435100"/>
+            <a:ext cx="3774965" cy="4691063"/>
           </a:xfrm>
         </p:spPr>
         <p:txBody>
@@ -3735,23 +3743,7 @@
             </a:r>
             <a:r>
               <a:rPr lang="en-US" dirty="0"/>
-              <a:t> must be made to </a:t>
-            </a:r>
-            <a:r>
-              <a:rPr lang="en-US"/>
-              <a:t>ensure </a:t>
-            </a:r>
-            <a:r>
-              <a:rPr lang="en-US" dirty="0"/>
-              <a:t>of</a:t>
-            </a:r>
-            <a:r>
-              <a:rPr lang="en-US"/>
-              <a:t> all </a:t>
-            </a:r>
-            <a:r>
-              <a:rPr lang="en-US" dirty="0"/>
-              <a:t>GL commands have been submitted to the device</a:t>
+              <a:t> must be made to ensure of all GL commands have been submitted to the device</a:t>
             </a:r>
           </a:p>
           <a:p>
@@ -3761,21 +3753,47 @@
             </a:pPr>
             <a:r>
               <a:rPr lang="en-US" dirty="0"/>
-              <a:t>Acquire ownership of shared objects </a:t>
-            </a:r>
-            <a:r>
-              <a:rPr lang="en-US"/>
-              <a:t>using </a:t>
-            </a:r>
-            <a:r>
-              <a:rPr lang="en-US" b="1" smtClean="0">
-                <a:solidFill>
-                  <a:srgbClr val="3366FF"/>
-                </a:solidFill>
-                <a:latin typeface="Courier New"/>
-                <a:cs typeface="Courier New"/>
-              </a:rPr>
-              <a:t>clEnqueueAcquireGLObjects(</a:t>
+              <a:t>Acquire ownership of shared objects using </a:t>
+            </a:r>
+            <a:r>
+              <a:rPr lang="en-US" b="1" dirty="0" err="1" smtClean="0">
+                <a:solidFill>
+                  <a:srgbClr val="3366FF"/>
+                </a:solidFill>
+                <a:latin typeface="Courier New"/>
+                <a:cs typeface="Courier New"/>
+              </a:rPr>
+              <a:t>queue.</a:t>
+            </a:r>
+            <a:r>
+              <a:rPr lang="en-US" b="1" dirty="0" err="1">
+                <a:solidFill>
+                  <a:srgbClr val="3366FF"/>
+                </a:solidFill>
+                <a:latin typeface="Courier New"/>
+                <a:cs typeface="Courier New"/>
+              </a:rPr>
+              <a:t>e</a:t>
+            </a:r>
+            <a:r>
+              <a:rPr lang="en-US" b="1" dirty="0" err="1" smtClean="0">
+                <a:solidFill>
+                  <a:srgbClr val="3366FF"/>
+                </a:solidFill>
+                <a:latin typeface="Courier New"/>
+                <a:cs typeface="Courier New"/>
+              </a:rPr>
+              <a:t>nqueueAcquireGLObjects</a:t>
+            </a:r>
+            <a:r>
+              <a:rPr lang="en-US" b="1" dirty="0" smtClean="0">
+                <a:solidFill>
+                  <a:srgbClr val="3366FF"/>
+                </a:solidFill>
+                <a:latin typeface="Courier New"/>
+                <a:cs typeface="Courier New"/>
+              </a:rPr>
+              <a:t>(</a:t>
             </a:r>
             <a:r>
               <a:rPr lang="en-US" b="1" dirty="0">
@@ -3817,21 +3835,37 @@
             </a:pPr>
             <a:r>
               <a:rPr lang="en-US" dirty="0"/>
-              <a:t>Release ownership of shared objects </a:t>
-            </a:r>
-            <a:r>
-              <a:rPr lang="en-US"/>
-              <a:t>using </a:t>
-            </a:r>
-            <a:r>
-              <a:rPr lang="en-US" b="1" smtClean="0">
-                <a:solidFill>
-                  <a:srgbClr val="3366FF"/>
-                </a:solidFill>
-                <a:latin typeface="Courier New"/>
-                <a:cs typeface="Courier New"/>
-              </a:rPr>
-              <a:t>clEnqueueReleaseGLObjects(</a:t>
+              <a:t>Release ownership of shared objects using </a:t>
+            </a:r>
+            <a:r>
+              <a:rPr lang="en-US" b="1" dirty="0" err="1" smtClean="0">
+                <a:solidFill>
+                  <a:srgbClr val="3366FF"/>
+                </a:solidFill>
+                <a:latin typeface="Courier New"/>
+                <a:cs typeface="Courier New"/>
+              </a:rPr>
+              <a:t>queue.e</a:t>
+            </a:r>
+            <a:r>
+              <a:rPr lang="en-US" b="1" dirty="0" err="1" smtClean="0">
+                <a:solidFill>
+                  <a:srgbClr val="3366FF"/>
+                </a:solidFill>
+                <a:latin typeface="Courier New"/>
+                <a:cs typeface="Courier New"/>
+              </a:rPr>
+              <a:t>nqueueReleaseGLObjects</a:t>
+            </a:r>
+            <a:r>
+              <a:rPr lang="en-US" b="1" dirty="0" smtClean="0">
+                <a:solidFill>
+                  <a:srgbClr val="3366FF"/>
+                </a:solidFill>
+                <a:latin typeface="Courier New"/>
+                <a:cs typeface="Courier New"/>
+              </a:rPr>
+              <a:t>(</a:t>
             </a:r>
             <a:r>
               <a:rPr lang="en-US" b="1" dirty="0">
@@ -3871,7 +3905,7 @@
         </p:nvSpPr>
         <p:spPr>
           <a:xfrm>
-            <a:off x="3779912" y="273050"/>
+            <a:off x="4103981" y="273050"/>
             <a:ext cx="4906888" cy="5853113"/>
           </a:xfrm>
         </p:spPr>
@@ -4136,13 +4170,8 @@
                 <a:latin typeface="Courier New"/>
                 <a:cs typeface="Courier New"/>
               </a:rPr>
-              <a:t>/Image</a:t>
-            </a:r>
-          </a:p>
-          <a:p>
-            <a:pPr marL="0" indent="0">
-              <a:buNone/>
-            </a:pPr>
+              <a:t>/</a:t>
+            </a:r>
             <a:r>
               <a:rPr lang="en-US" sz="1200" b="1" dirty="0" smtClean="0">
                 <a:solidFill>
@@ -4151,7 +4180,32 @@
                 <a:latin typeface="Courier New"/>
                 <a:cs typeface="Courier New"/>
               </a:rPr>
-              <a:t>// - </a:t>
+              <a:t>Image</a:t>
+            </a:r>
+          </a:p>
+          <a:p>
+            <a:pPr marL="0" indent="0">
+              <a:buNone/>
+            </a:pPr>
+            <a:r>
+              <a:rPr lang="en-US" sz="1200" b="1" dirty="0" smtClean="0">
+                <a:solidFill>
+                  <a:srgbClr val="3366FF"/>
+                </a:solidFill>
+                <a:latin typeface="Courier New"/>
+                <a:cs typeface="Courier New"/>
+              </a:rPr>
+              <a:t>/</a:t>
+            </a:r>
+            <a:r>
+              <a:rPr lang="en-US" sz="1200" b="1" dirty="0" smtClean="0">
+                <a:solidFill>
+                  <a:srgbClr val="3366FF"/>
+                </a:solidFill>
+                <a:latin typeface="Courier New"/>
+                <a:cs typeface="Courier New"/>
+              </a:rPr>
+              <a:t>/ - </a:t>
             </a:r>
             <a:r>
               <a:rPr lang="en-US" sz="1200" b="1" dirty="0" err="1" smtClean="0">
@@ -4387,6 +4441,78 @@
       </p:grpSpPr>
       <p:sp>
         <p:nvSpPr>
+          <p:cNvPr id="5" name="Title 4"/>
+          <p:cNvSpPr>
+            <a:spLocks noGrp="1"/>
+          </p:cNvSpPr>
+          <p:nvPr>
+            <p:ph type="title"/>
+          </p:nvPr>
+        </p:nvSpPr>
+        <p:spPr/>
+        <p:txBody>
+          <a:bodyPr/>
+          <a:lstStyle/>
+          <a:p>
+            <a:r>
+              <a:rPr lang="en-US" dirty="0" err="1" smtClean="0"/>
+              <a:t>cl_khr_egl_image</a:t>
+            </a:r>
+            <a:endParaRPr lang="en-US" dirty="0"/>
+          </a:p>
+        </p:txBody>
+      </p:sp>
+      <p:sp>
+        <p:nvSpPr>
+          <p:cNvPr id="6" name="Content Placeholder 5"/>
+          <p:cNvSpPr>
+            <a:spLocks noGrp="1"/>
+          </p:cNvSpPr>
+          <p:nvPr>
+            <p:ph idx="1"/>
+          </p:nvPr>
+        </p:nvSpPr>
+        <p:spPr/>
+        <p:txBody>
+          <a:bodyPr/>
+          <a:lstStyle/>
+          <a:p>
+            <a:endParaRPr lang="en-US"/>
+          </a:p>
+        </p:txBody>
+      </p:sp>
+    </p:spTree>
+    <p:extLst>
+      <p:ext uri="{BB962C8B-B14F-4D97-AF65-F5344CB8AC3E}">
+        <p14:creationId xmlns:p14="http://schemas.microsoft.com/office/powerpoint/2010/main" val="2578037368"/>
+      </p:ext>
+    </p:extLst>
+  </p:cSld>
+  <p:clrMapOvr>
+    <a:masterClrMapping/>
+  </p:clrMapOvr>
+</p:sld>
+</file>
+
+<file path=ppt/slides/slide12.xml><?xml version="1.0" encoding="utf-8"?>
+<p:sld xmlns:a="http://schemas.openxmlformats.org/drawingml/2006/main" xmlns:r="http://schemas.openxmlformats.org/officeDocument/2006/relationships" xmlns:p="http://schemas.openxmlformats.org/presentationml/2006/main">
+  <p:cSld>
+    <p:spTree>
+      <p:nvGrpSpPr>
+        <p:cNvPr id="1" name=""/>
+        <p:cNvGrpSpPr/>
+        <p:nvPr/>
+      </p:nvGrpSpPr>
+      <p:grpSpPr>
+        <a:xfrm>
+          <a:off x="0" y="0"/>
+          <a:ext cx="0" cy="0"/>
+          <a:chOff x="0" y="0"/>
+          <a:chExt cx="0" cy="0"/>
+        </a:xfrm>
+      </p:grpSpPr>
+      <p:sp>
+        <p:nvSpPr>
           <p:cNvPr id="2" name="Title 1"/>
           <p:cNvSpPr>
             <a:spLocks noGrp="1"/>
@@ -4562,7 +4688,7 @@
 </p:sld>
 </file>
 
-<file path=ppt/slides/slide12.xml><?xml version="1.0" encoding="utf-8"?>
+<file path=ppt/slides/slide13.xml><?xml version="1.0" encoding="utf-8"?>
 <p:sld xmlns:a="http://schemas.openxmlformats.org/drawingml/2006/main" xmlns:r="http://schemas.openxmlformats.org/officeDocument/2006/relationships" xmlns:p="http://schemas.openxmlformats.org/presentationml/2006/main">
   <p:cSld>
     <p:spTree>
@@ -4596,7 +4722,15 @@
           <a:p>
             <a:r>
               <a:rPr lang="en-GB" dirty="0" smtClean="0"/>
-              <a:t>Exercise 14: CL/GL </a:t>
+              <a:t>Exercise </a:t>
+            </a:r>
+            <a:r>
+              <a:rPr lang="en-GB" dirty="0" smtClean="0"/>
+              <a:t>4</a:t>
+            </a:r>
+            <a:r>
+              <a:rPr lang="en-GB" dirty="0" smtClean="0"/>
+              <a:t>: CL/GL </a:t>
             </a:r>
             <a:r>
               <a:rPr lang="en-GB" dirty="0" err="1" smtClean="0"/>
@@ -4624,7 +4758,7 @@
         </p:spPr>
         <p:txBody>
           <a:bodyPr>
-            <a:normAutofit fontScale="85000" lnSpcReduction="20000"/>
+            <a:normAutofit fontScale="70000" lnSpcReduction="20000"/>
           </a:bodyPr>
           <a:lstStyle/>
           <a:p>
@@ -4694,18 +4828,18 @@
               <a:t>There is an </a:t>
             </a:r>
             <a:r>
-              <a:rPr lang="en-GB" smtClean="0">
+              <a:rPr lang="en-GB" dirty="0" err="1" smtClean="0">
                 <a:latin typeface="Trebuchet MS"/>
                 <a:cs typeface="Trebuchet MS"/>
               </a:rPr>
-              <a:t>OpenCL that </a:t>
+              <a:t>OpenCL</a:t>
             </a:r>
             <a:r>
               <a:rPr lang="en-GB" dirty="0" smtClean="0">
                 <a:latin typeface="Trebuchet MS"/>
                 <a:cs typeface="Trebuchet MS"/>
               </a:rPr>
-              <a:t>is filled with pixel data, but this isn’t shared with OpenGL</a:t>
+              <a:t> that is filled with pixel data, but this isn’t shared with OpenGL</a:t>
             </a:r>
           </a:p>
           <a:p>
@@ -4775,14 +4909,28 @@
                 <a:latin typeface="Trebuchet MS"/>
                 <a:cs typeface="Trebuchet MS"/>
               </a:rPr>
-              <a:t>Make it look </a:t>
-            </a:r>
-            <a:r>
-              <a:rPr lang="en-GB" smtClean="0">
+              <a:t>Make it look nice</a:t>
+            </a:r>
+            <a:r>
+              <a:rPr lang="en-GB" dirty="0" smtClean="0">
                 <a:latin typeface="Trebuchet MS"/>
                 <a:cs typeface="Trebuchet MS"/>
               </a:rPr>
-              <a:t>nice!</a:t>
+              <a:t>!</a:t>
+            </a:r>
+          </a:p>
+          <a:p>
+            <a:pPr>
+              <a:lnSpc>
+                <a:spcPct val="110000"/>
+              </a:lnSpc>
+            </a:pPr>
+            <a:r>
+              <a:rPr lang="en-GB" dirty="0" smtClean="0">
+                <a:latin typeface="Trebuchet MS"/>
+                <a:cs typeface="Trebuchet MS"/>
+              </a:rPr>
+              <a:t>Solutions using Image/Texture Objects and Buffer/Vertex Buffer Objects will be provided</a:t>
             </a:r>
             <a:endParaRPr lang="en-GB" dirty="0" smtClean="0">
               <a:latin typeface="Trebuchet MS"/>
@@ -5024,30 +5172,73 @@
         </p:nvSpPr>
         <p:spPr/>
         <p:txBody>
-          <a:bodyPr/>
+          <a:bodyPr>
+            <a:normAutofit fontScale="92500" lnSpcReduction="20000"/>
+          </a:bodyPr>
           <a:lstStyle/>
           <a:p>
             <a:r>
               <a:rPr lang="en-GB" dirty="0" smtClean="0"/>
-              <a:t>Create an OpenCL context with OpenGL sharing enabled</a:t>
+              <a:t>Initialize OpenGL as normal</a:t>
             </a:r>
           </a:p>
           <a:p>
             <a:r>
               <a:rPr lang="en-GB" dirty="0" smtClean="0"/>
-              <a:t>Create OpenCL image/buffer objects from OpenGL texture/buffer objects</a:t>
-            </a:r>
-          </a:p>
-          <a:p>
+              <a:t>Create </a:t>
+            </a:r>
             <a:r>
               <a:rPr lang="en-GB" dirty="0" smtClean="0"/>
-              <a:t>Acquire ownership of the object in OpenCL before using it, and release ownership when finished</a:t>
-            </a:r>
-          </a:p>
-          <a:p>
+              <a:t>an OpenCL context with OpenGL sharing </a:t>
+            </a:r>
             <a:r>
               <a:rPr lang="en-GB" dirty="0" smtClean="0"/>
-              <a:t>Render textures/buffers from GL as usual</a:t>
+              <a:t>enabled</a:t>
+            </a:r>
+          </a:p>
+          <a:p>
+            <a:r>
+              <a:rPr lang="en-GB" dirty="0" smtClean="0"/>
+              <a:t>Create OpenGL texture/buffer objects</a:t>
+            </a:r>
+            <a:endParaRPr lang="en-GB" dirty="0" smtClean="0"/>
+          </a:p>
+          <a:p>
+            <a:r>
+              <a:rPr lang="en-GB" dirty="0" smtClean="0"/>
+              <a:t>Create </a:t>
+            </a:r>
+            <a:r>
+              <a:rPr lang="en-GB" dirty="0" err="1" smtClean="0"/>
+              <a:t>OpenCL</a:t>
+            </a:r>
+            <a:r>
+              <a:rPr lang="en-GB" dirty="0" smtClean="0"/>
+              <a:t> image/buffer objects from the OpenGL texture/buffer objects</a:t>
+            </a:r>
+          </a:p>
+          <a:p>
+            <a:r>
+              <a:rPr lang="en-GB" dirty="0" smtClean="0"/>
+              <a:t>Acquire </a:t>
+            </a:r>
+            <a:r>
+              <a:rPr lang="en-GB" dirty="0" smtClean="0"/>
+              <a:t>ownership of the object in OpenCL before using it, and release ownership when </a:t>
+            </a:r>
+            <a:r>
+              <a:rPr lang="en-GB" dirty="0" smtClean="0"/>
+              <a:t>finished</a:t>
+            </a:r>
+          </a:p>
+          <a:p>
+            <a:r>
+              <a:rPr lang="en-GB" dirty="0" smtClean="0"/>
+              <a:t>Render </a:t>
+            </a:r>
+            <a:r>
+              <a:rPr lang="en-GB" dirty="0" smtClean="0"/>
+              <a:t>textures/buffers from GL as usual</a:t>
             </a:r>
             <a:endParaRPr lang="en-GB" dirty="0"/>
           </a:p>
@@ -7787,31 +7978,31 @@
                 <a:latin typeface="Courier New"/>
                 <a:cs typeface="Courier New"/>
               </a:rPr>
-              <a:t>cl:</a:t>
-            </a:r>
-            <a:r>
-              <a:rPr lang="en-US" b="1" smtClean="0">
-                <a:solidFill>
-                  <a:srgbClr val="3366FF"/>
-                </a:solidFill>
-                <a:latin typeface="Courier New"/>
-                <a:cs typeface="Courier New"/>
-              </a:rPr>
-              <a:t>:ImageGL</a:t>
-            </a:r>
-            <a:r>
-              <a:rPr lang="en-US" smtClean="0">
-                <a:latin typeface="Trebuchet MS"/>
-                <a:cs typeface="Trebuchet MS"/>
-              </a:rPr>
-              <a:t> </a:t>
+              <a:t>cl::</a:t>
+            </a:r>
+            <a:r>
+              <a:rPr lang="en-US" b="1" dirty="0" err="1" smtClean="0">
+                <a:solidFill>
+                  <a:srgbClr val="3366FF"/>
+                </a:solidFill>
+                <a:latin typeface="Courier New"/>
+                <a:cs typeface="Courier New"/>
+              </a:rPr>
+              <a:t>ImageGL</a:t>
             </a:r>
             <a:r>
               <a:rPr lang="en-US" dirty="0" smtClean="0">
                 <a:latin typeface="Trebuchet MS"/>
                 <a:cs typeface="Trebuchet MS"/>
               </a:rPr>
-              <a:t>or </a:t>
+              <a:t> </a:t>
+            </a:r>
+            <a:r>
+              <a:rPr lang="en-US" dirty="0" smtClean="0">
+                <a:latin typeface="Trebuchet MS"/>
+                <a:cs typeface="Trebuchet MS"/>
+              </a:rPr>
+              <a:t>* or </a:t>
             </a:r>
             <a:r>
               <a:rPr lang="en-US" b="1" dirty="0" smtClean="0">
@@ -8549,6 +8740,114 @@
               <a:t>;</a:t>
             </a:r>
             <a:endParaRPr lang="en-US" sz="1200" b="1" dirty="0" smtClean="0">
+              <a:solidFill>
+                <a:srgbClr val="3366FF"/>
+              </a:solidFill>
+              <a:latin typeface="Courier New"/>
+              <a:cs typeface="Courier New"/>
+            </a:endParaRPr>
+          </a:p>
+        </p:txBody>
+      </p:sp>
+      <p:sp>
+        <p:nvSpPr>
+          <p:cNvPr id="5" name="TextBox 4"/>
+          <p:cNvSpPr txBox="1"/>
+          <p:nvPr/>
+        </p:nvSpPr>
+        <p:spPr>
+          <a:xfrm>
+            <a:off x="467544" y="6381328"/>
+            <a:ext cx="8280920" cy="276999"/>
+          </a:xfrm>
+          <a:prstGeom prst="rect">
+            <a:avLst/>
+          </a:prstGeom>
+          <a:noFill/>
+        </p:spPr>
+        <p:txBody>
+          <a:bodyPr wrap="square" rtlCol="0">
+            <a:spAutoFit/>
+          </a:bodyPr>
+          <a:lstStyle/>
+          <a:p>
+            <a:r>
+              <a:rPr lang="en-GB" sz="1200" dirty="0" smtClean="0"/>
+              <a:t>*</a:t>
+            </a:r>
+            <a:r>
+              <a:rPr lang="en-GB" sz="1200" dirty="0" err="1" smtClean="0"/>
+              <a:t>OpenCL</a:t>
+            </a:r>
+            <a:r>
+              <a:rPr lang="en-GB" sz="1200" dirty="0" smtClean="0"/>
+              <a:t> 1.2: </a:t>
+            </a:r>
+            <a:r>
+              <a:rPr lang="en-GB" sz="1200" b="1" dirty="0" smtClean="0">
+                <a:solidFill>
+                  <a:srgbClr val="3366FF"/>
+                </a:solidFill>
+                <a:latin typeface="Courier New"/>
+                <a:cs typeface="Courier New"/>
+              </a:rPr>
+              <a:t>cl::</a:t>
+            </a:r>
+            <a:r>
+              <a:rPr lang="en-GB" sz="1200" b="1" dirty="0" err="1" smtClean="0">
+                <a:solidFill>
+                  <a:srgbClr val="3366FF"/>
+                </a:solidFill>
+                <a:latin typeface="Courier New"/>
+                <a:cs typeface="Courier New"/>
+              </a:rPr>
+              <a:t>ImageGL</a:t>
+            </a:r>
+            <a:r>
+              <a:rPr lang="en-GB" sz="1200" dirty="0" smtClean="0">
+                <a:solidFill>
+                  <a:srgbClr val="3366FF"/>
+                </a:solidFill>
+              </a:rPr>
+              <a:t> </a:t>
+            </a:r>
+            <a:r>
+              <a:rPr lang="en-GB" sz="1200" dirty="0" smtClean="0"/>
+              <a:t>; </a:t>
+            </a:r>
+            <a:r>
+              <a:rPr lang="en-GB" sz="1200" dirty="0" err="1" smtClean="0"/>
+              <a:t>OpenCL</a:t>
+            </a:r>
+            <a:r>
+              <a:rPr lang="en-GB" sz="1200" dirty="0" smtClean="0"/>
+              <a:t> 1.1: </a:t>
+            </a:r>
+            <a:r>
+              <a:rPr lang="en-GB" sz="1200" b="1" dirty="0" smtClean="0">
+                <a:solidFill>
+                  <a:srgbClr val="3366FF"/>
+                </a:solidFill>
+                <a:latin typeface="Courier New"/>
+                <a:cs typeface="Courier New"/>
+              </a:rPr>
+              <a:t>cl::Image2DGL</a:t>
+            </a:r>
+            <a:r>
+              <a:rPr lang="en-GB" sz="1200" dirty="0" smtClean="0"/>
+              <a:t> and </a:t>
+            </a:r>
+            <a:r>
+              <a:rPr lang="en-GB" sz="1200" b="1" dirty="0" smtClean="0">
+                <a:solidFill>
+                  <a:srgbClr val="3366FF"/>
+                </a:solidFill>
+                <a:latin typeface="Courier New"/>
+                <a:cs typeface="Courier New"/>
+              </a:rPr>
+              <a:t>cl::Image3DGL</a:t>
+            </a:r>
+            <a:endParaRPr lang="en-GB" sz="1200" b="1" dirty="0">
               <a:solidFill>
                 <a:srgbClr val="3366FF"/>
               </a:solidFill>

</xml_diff>

<commit_message>
Fixed a couple of minor typos left over from Technicolor notes.
</commit_message>
<xml_diff>
--- a/slides/advanced_part4.pptx
+++ b/slides/advanced_part4.pptx
@@ -204,7 +204,7 @@
           <a:p>
             <a:fld id="{2E256997-BFE9-1645-ACA2-FB0069B34735}" type="datetimeFigureOut">
               <a:rPr lang="en-US" smtClean="0"/>
-              <a:t>06/05/15</a:t>
+              <a:t>07/05/15</a:t>
             </a:fld>
             <a:endParaRPr lang="en-GB"/>
           </a:p>
@@ -738,7 +738,7 @@
           <a:p>
             <a:fld id="{63635F44-C3D0-2B4D-8E09-42DBC0FC5507}" type="datetimeFigureOut">
               <a:rPr lang="en-US" smtClean="0"/>
-              <a:t>06/05/15</a:t>
+              <a:t>07/05/15</a:t>
             </a:fld>
             <a:endParaRPr lang="en-GB"/>
           </a:p>
@@ -908,7 +908,7 @@
           <a:p>
             <a:fld id="{63635F44-C3D0-2B4D-8E09-42DBC0FC5507}" type="datetimeFigureOut">
               <a:rPr lang="en-US" smtClean="0"/>
-              <a:t>06/05/15</a:t>
+              <a:t>07/05/15</a:t>
             </a:fld>
             <a:endParaRPr lang="en-GB"/>
           </a:p>
@@ -1088,7 +1088,7 @@
           <a:p>
             <a:fld id="{63635F44-C3D0-2B4D-8E09-42DBC0FC5507}" type="datetimeFigureOut">
               <a:rPr lang="en-US" smtClean="0"/>
-              <a:t>06/05/15</a:t>
+              <a:t>07/05/15</a:t>
             </a:fld>
             <a:endParaRPr lang="en-GB"/>
           </a:p>
@@ -1258,7 +1258,7 @@
           <a:p>
             <a:fld id="{63635F44-C3D0-2B4D-8E09-42DBC0FC5507}" type="datetimeFigureOut">
               <a:rPr lang="en-US" smtClean="0"/>
-              <a:t>06/05/15</a:t>
+              <a:t>07/05/15</a:t>
             </a:fld>
             <a:endParaRPr lang="en-GB"/>
           </a:p>
@@ -1504,7 +1504,7 @@
           <a:p>
             <a:fld id="{63635F44-C3D0-2B4D-8E09-42DBC0FC5507}" type="datetimeFigureOut">
               <a:rPr lang="en-US" smtClean="0"/>
-              <a:t>06/05/15</a:t>
+              <a:t>07/05/15</a:t>
             </a:fld>
             <a:endParaRPr lang="en-GB"/>
           </a:p>
@@ -1792,7 +1792,7 @@
           <a:p>
             <a:fld id="{63635F44-C3D0-2B4D-8E09-42DBC0FC5507}" type="datetimeFigureOut">
               <a:rPr lang="en-US" smtClean="0"/>
-              <a:t>06/05/15</a:t>
+              <a:t>07/05/15</a:t>
             </a:fld>
             <a:endParaRPr lang="en-GB"/>
           </a:p>
@@ -2214,7 +2214,7 @@
           <a:p>
             <a:fld id="{63635F44-C3D0-2B4D-8E09-42DBC0FC5507}" type="datetimeFigureOut">
               <a:rPr lang="en-US" smtClean="0"/>
-              <a:t>06/05/15</a:t>
+              <a:t>07/05/15</a:t>
             </a:fld>
             <a:endParaRPr lang="en-GB"/>
           </a:p>
@@ -2332,7 +2332,7 @@
           <a:p>
             <a:fld id="{63635F44-C3D0-2B4D-8E09-42DBC0FC5507}" type="datetimeFigureOut">
               <a:rPr lang="en-US" smtClean="0"/>
-              <a:t>06/05/15</a:t>
+              <a:t>07/05/15</a:t>
             </a:fld>
             <a:endParaRPr lang="en-GB"/>
           </a:p>
@@ -2427,7 +2427,7 @@
           <a:p>
             <a:fld id="{63635F44-C3D0-2B4D-8E09-42DBC0FC5507}" type="datetimeFigureOut">
               <a:rPr lang="en-US" smtClean="0"/>
-              <a:t>06/05/15</a:t>
+              <a:t>07/05/15</a:t>
             </a:fld>
             <a:endParaRPr lang="en-GB"/>
           </a:p>
@@ -2704,7 +2704,7 @@
           <a:p>
             <a:fld id="{63635F44-C3D0-2B4D-8E09-42DBC0FC5507}" type="datetimeFigureOut">
               <a:rPr lang="en-US" smtClean="0"/>
-              <a:t>06/05/15</a:t>
+              <a:t>07/05/15</a:t>
             </a:fld>
             <a:endParaRPr lang="en-GB"/>
           </a:p>
@@ -2957,7 +2957,7 @@
           <a:p>
             <a:fld id="{63635F44-C3D0-2B4D-8E09-42DBC0FC5507}" type="datetimeFigureOut">
               <a:rPr lang="en-US" smtClean="0"/>
-              <a:t>06/05/15</a:t>
+              <a:t>07/05/15</a:t>
             </a:fld>
             <a:endParaRPr lang="en-GB"/>
           </a:p>
@@ -3170,7 +3170,7 @@
           <a:p>
             <a:fld id="{63635F44-C3D0-2B4D-8E09-42DBC0FC5507}" type="datetimeFigureOut">
               <a:rPr lang="en-US" smtClean="0"/>
-              <a:t>06/05/15</a:t>
+              <a:t>07/05/15</a:t>
             </a:fld>
             <a:endParaRPr lang="en-GB"/>
           </a:p>
@@ -3735,7 +3735,15 @@
             </a:r>
             <a:r>
               <a:rPr lang="en-US" dirty="0"/>
-              <a:t> must be made to ensure of all GL commands have been submitted to the device</a:t>
+              <a:t> must be made to ensure </a:t>
+            </a:r>
+            <a:r>
+              <a:rPr lang="en-US" dirty="0" smtClean="0"/>
+              <a:t>all </a:t>
+            </a:r>
+            <a:r>
+              <a:rPr lang="en-US" dirty="0"/>
+              <a:t>GL commands have been submitted to the device</a:t>
             </a:r>
           </a:p>
           <a:p>
@@ -4789,18 +4797,25 @@
               <a:t>There is an </a:t>
             </a:r>
             <a:r>
-              <a:rPr lang="en-GB" dirty="0" err="1" smtClean="0">
+              <a:rPr lang="en-GB" smtClean="0">
                 <a:latin typeface="Trebuchet MS"/>
                 <a:cs typeface="Trebuchet MS"/>
               </a:rPr>
-              <a:t>OpenCL</a:t>
+              <a:t>OpenCL </a:t>
+            </a:r>
+            <a:r>
+              <a:rPr lang="en-GB" smtClean="0">
+                <a:latin typeface="Trebuchet MS"/>
+                <a:cs typeface="Trebuchet MS"/>
+              </a:rPr>
+              <a:t>buffer that </a:t>
             </a:r>
             <a:r>
               <a:rPr lang="en-GB" dirty="0" smtClean="0">
                 <a:latin typeface="Trebuchet MS"/>
                 <a:cs typeface="Trebuchet MS"/>
               </a:rPr>
-              <a:t> that is filled with pixel data, but this isn’t shared with OpenGL</a:t>
+              <a:t>is filled with pixel data, but this isn’t shared with OpenGL</a:t>
             </a:r>
           </a:p>
           <a:p>
@@ -4968,11 +4983,7 @@
           <a:p>
             <a:r>
               <a:rPr lang="en-US" smtClean="0"/>
-              <a:t>Khronos </a:t>
-            </a:r>
-            <a:r>
-              <a:rPr lang="en-US" smtClean="0"/>
-              <a:t>has specified </a:t>
+              <a:t>Khronos has specified </a:t>
             </a:r>
             <a:r>
               <a:rPr lang="en-US" dirty="0" smtClean="0"/>

</xml_diff>

<commit_message>
Added slide about cl_khr_egl_image.
</commit_message>
<xml_diff>
--- a/slides/advanced_part4.pptx
+++ b/slides/advanced_part4.pptx
@@ -18,8 +18,8 @@
     <p:sldId id="264" r:id="rId9"/>
     <p:sldId id="265" r:id="rId10"/>
     <p:sldId id="266" r:id="rId11"/>
-    <p:sldId id="269" r:id="rId12"/>
-    <p:sldId id="267" r:id="rId13"/>
+    <p:sldId id="267" r:id="rId12"/>
+    <p:sldId id="269" r:id="rId13"/>
     <p:sldId id="268" r:id="rId14"/>
   </p:sldIdLst>
   <p:sldSz cx="9144000" cy="6858000" type="screen4x3"/>
@@ -204,7 +204,7 @@
           <a:p>
             <a:fld id="{2E256997-BFE9-1645-ACA2-FB0069B34735}" type="datetimeFigureOut">
               <a:rPr lang="en-US" smtClean="0"/>
-              <a:t>07/05/15</a:t>
+              <a:t>09/05/15</a:t>
             </a:fld>
             <a:endParaRPr lang="en-GB"/>
           </a:p>
@@ -538,7 +538,7 @@
             <a:fld id="{9B3F2D69-97A9-4C41-91BD-6A22F8270148}" type="slidenum">
               <a:rPr lang="en-GB" smtClean="0"/>
               <a:pPr/>
-              <a:t>12</a:t>
+              <a:t>11</a:t>
             </a:fld>
             <a:endParaRPr lang="en-GB"/>
           </a:p>
@@ -738,7 +738,7 @@
           <a:p>
             <a:fld id="{63635F44-C3D0-2B4D-8E09-42DBC0FC5507}" type="datetimeFigureOut">
               <a:rPr lang="en-US" smtClean="0"/>
-              <a:t>07/05/15</a:t>
+              <a:t>09/05/15</a:t>
             </a:fld>
             <a:endParaRPr lang="en-GB"/>
           </a:p>
@@ -908,7 +908,7 @@
           <a:p>
             <a:fld id="{63635F44-C3D0-2B4D-8E09-42DBC0FC5507}" type="datetimeFigureOut">
               <a:rPr lang="en-US" smtClean="0"/>
-              <a:t>07/05/15</a:t>
+              <a:t>09/05/15</a:t>
             </a:fld>
             <a:endParaRPr lang="en-GB"/>
           </a:p>
@@ -1088,7 +1088,7 @@
           <a:p>
             <a:fld id="{63635F44-C3D0-2B4D-8E09-42DBC0FC5507}" type="datetimeFigureOut">
               <a:rPr lang="en-US" smtClean="0"/>
-              <a:t>07/05/15</a:t>
+              <a:t>09/05/15</a:t>
             </a:fld>
             <a:endParaRPr lang="en-GB"/>
           </a:p>
@@ -1258,7 +1258,7 @@
           <a:p>
             <a:fld id="{63635F44-C3D0-2B4D-8E09-42DBC0FC5507}" type="datetimeFigureOut">
               <a:rPr lang="en-US" smtClean="0"/>
-              <a:t>07/05/15</a:t>
+              <a:t>09/05/15</a:t>
             </a:fld>
             <a:endParaRPr lang="en-GB"/>
           </a:p>
@@ -1504,7 +1504,7 @@
           <a:p>
             <a:fld id="{63635F44-C3D0-2B4D-8E09-42DBC0FC5507}" type="datetimeFigureOut">
               <a:rPr lang="en-US" smtClean="0"/>
-              <a:t>07/05/15</a:t>
+              <a:t>09/05/15</a:t>
             </a:fld>
             <a:endParaRPr lang="en-GB"/>
           </a:p>
@@ -1792,7 +1792,7 @@
           <a:p>
             <a:fld id="{63635F44-C3D0-2B4D-8E09-42DBC0FC5507}" type="datetimeFigureOut">
               <a:rPr lang="en-US" smtClean="0"/>
-              <a:t>07/05/15</a:t>
+              <a:t>09/05/15</a:t>
             </a:fld>
             <a:endParaRPr lang="en-GB"/>
           </a:p>
@@ -2214,7 +2214,7 @@
           <a:p>
             <a:fld id="{63635F44-C3D0-2B4D-8E09-42DBC0FC5507}" type="datetimeFigureOut">
               <a:rPr lang="en-US" smtClean="0"/>
-              <a:t>07/05/15</a:t>
+              <a:t>09/05/15</a:t>
             </a:fld>
             <a:endParaRPr lang="en-GB"/>
           </a:p>
@@ -2332,7 +2332,7 @@
           <a:p>
             <a:fld id="{63635F44-C3D0-2B4D-8E09-42DBC0FC5507}" type="datetimeFigureOut">
               <a:rPr lang="en-US" smtClean="0"/>
-              <a:t>07/05/15</a:t>
+              <a:t>09/05/15</a:t>
             </a:fld>
             <a:endParaRPr lang="en-GB"/>
           </a:p>
@@ -2427,7 +2427,7 @@
           <a:p>
             <a:fld id="{63635F44-C3D0-2B4D-8E09-42DBC0FC5507}" type="datetimeFigureOut">
               <a:rPr lang="en-US" smtClean="0"/>
-              <a:t>07/05/15</a:t>
+              <a:t>09/05/15</a:t>
             </a:fld>
             <a:endParaRPr lang="en-GB"/>
           </a:p>
@@ -2704,7 +2704,7 @@
           <a:p>
             <a:fld id="{63635F44-C3D0-2B4D-8E09-42DBC0FC5507}" type="datetimeFigureOut">
               <a:rPr lang="en-US" smtClean="0"/>
-              <a:t>07/05/15</a:t>
+              <a:t>09/05/15</a:t>
             </a:fld>
             <a:endParaRPr lang="en-GB"/>
           </a:p>
@@ -2957,7 +2957,7 @@
           <a:p>
             <a:fld id="{63635F44-C3D0-2B4D-8E09-42DBC0FC5507}" type="datetimeFigureOut">
               <a:rPr lang="en-US" smtClean="0"/>
-              <a:t>07/05/15</a:t>
+              <a:t>09/05/15</a:t>
             </a:fld>
             <a:endParaRPr lang="en-GB"/>
           </a:p>
@@ -3170,7 +3170,7 @@
           <a:p>
             <a:fld id="{63635F44-C3D0-2B4D-8E09-42DBC0FC5507}" type="datetimeFigureOut">
               <a:rPr lang="en-US" smtClean="0"/>
-              <a:t>07/05/15</a:t>
+              <a:t>09/05/15</a:t>
             </a:fld>
             <a:endParaRPr lang="en-GB"/>
           </a:p>
@@ -4411,7 +4411,7 @@
       </p:grpSpPr>
       <p:sp>
         <p:nvSpPr>
-          <p:cNvPr id="5" name="Title 4"/>
+          <p:cNvPr id="2" name="Title 1"/>
           <p:cNvSpPr>
             <a:spLocks noGrp="1"/>
           </p:cNvSpPr>
@@ -4425,16 +4425,16 @@
           <a:lstStyle/>
           <a:p>
             <a:r>
-              <a:rPr lang="en-US" dirty="0" err="1" smtClean="0"/>
-              <a:t>cl_khr_egl_image</a:t>
-            </a:r>
-            <a:endParaRPr lang="en-US" dirty="0"/>
-          </a:p>
-        </p:txBody>
-      </p:sp>
-      <p:sp>
-        <p:nvSpPr>
-          <p:cNvPr id="6" name="Content Placeholder 5"/>
+              <a:rPr lang="en-GB" dirty="0" err="1" smtClean="0"/>
+              <a:t>cl_khr_gl_event</a:t>
+            </a:r>
+            <a:endParaRPr lang="en-GB" dirty="0"/>
+          </a:p>
+        </p:txBody>
+      </p:sp>
+      <p:sp>
+        <p:nvSpPr>
+          <p:cNvPr id="3" name="Content Placeholder 2"/>
           <p:cNvSpPr>
             <a:spLocks noGrp="1"/>
           </p:cNvSpPr>
@@ -4444,17 +4444,132 @@
         </p:nvSpPr>
         <p:spPr/>
         <p:txBody>
-          <a:bodyPr/>
+          <a:bodyPr>
+            <a:normAutofit fontScale="77500" lnSpcReduction="20000"/>
+          </a:bodyPr>
           <a:lstStyle/>
           <a:p>
-            <a:endParaRPr lang="en-US"/>
+            <a:pPr>
+              <a:lnSpc>
+                <a:spcPct val="110000"/>
+              </a:lnSpc>
+            </a:pPr>
+            <a:r>
+              <a:rPr lang="en-GB" dirty="0" smtClean="0"/>
+              <a:t>This extension potentially improves performance by removing some of the requirements for explicit synchronization</a:t>
+            </a:r>
+            <a:endParaRPr lang="en-GB" dirty="0"/>
+          </a:p>
+          <a:p>
+            <a:pPr>
+              <a:lnSpc>
+                <a:spcPct val="110000"/>
+              </a:lnSpc>
+            </a:pPr>
+            <a:r>
+              <a:rPr lang="en-GB" dirty="0"/>
+              <a:t>P</a:t>
+            </a:r>
+            <a:r>
+              <a:rPr lang="en-GB" dirty="0" smtClean="0"/>
+              <a:t>rovides guarantees that all pending OpenGL operations are complete upon calling </a:t>
+            </a:r>
+            <a:r>
+              <a:rPr lang="en-GB" b="1" dirty="0" err="1">
+                <a:solidFill>
+                  <a:srgbClr val="3366FF"/>
+                </a:solidFill>
+                <a:latin typeface="Courier New"/>
+                <a:cs typeface="Courier New"/>
+              </a:rPr>
+              <a:t>e</a:t>
+            </a:r>
+            <a:r>
+              <a:rPr lang="en-GB" b="1" dirty="0" err="1" smtClean="0">
+                <a:solidFill>
+                  <a:srgbClr val="3366FF"/>
+                </a:solidFill>
+                <a:latin typeface="Courier New"/>
+                <a:cs typeface="Courier New"/>
+              </a:rPr>
+              <a:t>nqueueAcquireGLObjects</a:t>
+            </a:r>
+            <a:endParaRPr lang="en-GB" b="1" dirty="0" smtClean="0">
+              <a:solidFill>
+                <a:srgbClr val="3366FF"/>
+              </a:solidFill>
+              <a:latin typeface="Courier New"/>
+              <a:cs typeface="Courier New"/>
+            </a:endParaRPr>
+          </a:p>
+          <a:p>
+            <a:pPr>
+              <a:lnSpc>
+                <a:spcPct val="110000"/>
+              </a:lnSpc>
+            </a:pPr>
+            <a:r>
+              <a:rPr lang="en-GB" dirty="0" smtClean="0"/>
+              <a:t>Provides guarantees that all pending OpenCL operations are complete upon calling </a:t>
+            </a:r>
+            <a:r>
+              <a:rPr lang="en-GB" b="1" dirty="0" err="1" smtClean="0">
+                <a:solidFill>
+                  <a:srgbClr val="3366FF"/>
+                </a:solidFill>
+                <a:latin typeface="Courier New"/>
+                <a:cs typeface="Courier New"/>
+              </a:rPr>
+              <a:t>enqueueReleaseGLObjects</a:t>
+            </a:r>
+            <a:endParaRPr lang="en-GB" dirty="0" smtClean="0"/>
+          </a:p>
+          <a:p>
+            <a:pPr>
+              <a:lnSpc>
+                <a:spcPct val="110000"/>
+              </a:lnSpc>
+            </a:pPr>
+            <a:r>
+              <a:rPr lang="en-GB" dirty="0" smtClean="0"/>
+              <a:t>A </a:t>
+            </a:r>
+            <a:r>
+              <a:rPr lang="en-GB" b="1" dirty="0" err="1" smtClean="0">
+                <a:solidFill>
+                  <a:srgbClr val="3366FF"/>
+                </a:solidFill>
+                <a:latin typeface="Courier New"/>
+                <a:cs typeface="Courier New"/>
+              </a:rPr>
+              <a:t>GL_ARB_cl_event</a:t>
+            </a:r>
+            <a:r>
+              <a:rPr lang="en-GB" dirty="0" smtClean="0"/>
+              <a:t> extension in OpenGL allows us to link </a:t>
+            </a:r>
+            <a:r>
+              <a:rPr lang="en-GB" b="1" dirty="0" smtClean="0">
+                <a:solidFill>
+                  <a:srgbClr val="3366FF"/>
+                </a:solidFill>
+                <a:latin typeface="Courier New"/>
+                <a:cs typeface="Courier New"/>
+              </a:rPr>
+              <a:t>cl::Event </a:t>
+            </a:r>
+            <a:r>
+              <a:rPr lang="en-GB" dirty="0" smtClean="0"/>
+              <a:t>objects to GL sync objects, giving us more control over the synchronization process</a:t>
+            </a:r>
+            <a:endParaRPr lang="en-GB" dirty="0"/>
           </a:p>
         </p:txBody>
       </p:sp>
     </p:spTree>
     <p:extLst>
       <p:ext uri="{BB962C8B-B14F-4D97-AF65-F5344CB8AC3E}">
-        <p14:creationId xmlns:p14="http://schemas.microsoft.com/office/powerpoint/2010/main" val="2578037368"/>
+        <p14:creationId xmlns:p14="http://schemas.microsoft.com/office/powerpoint/2010/main" val="4093567555"/>
       </p:ext>
     </p:extLst>
   </p:cSld>
@@ -4490,7 +4605,7 @@
       </p:grpSpPr>
       <p:sp>
         <p:nvSpPr>
-          <p:cNvPr id="2" name="Title 1"/>
+          <p:cNvPr id="5" name="Title 4"/>
           <p:cNvSpPr>
             <a:spLocks noGrp="1"/>
           </p:cNvSpPr>
@@ -4504,16 +4619,16 @@
           <a:lstStyle/>
           <a:p>
             <a:r>
-              <a:rPr lang="en-GB" dirty="0" err="1" smtClean="0"/>
-              <a:t>cl_khr_gl_event</a:t>
-            </a:r>
-            <a:endParaRPr lang="en-GB" dirty="0"/>
-          </a:p>
-        </p:txBody>
-      </p:sp>
-      <p:sp>
-        <p:nvSpPr>
-          <p:cNvPr id="3" name="Content Placeholder 2"/>
+              <a:rPr lang="en-US" dirty="0" err="1" smtClean="0"/>
+              <a:t>cl_khr_egl_image</a:t>
+            </a:r>
+            <a:endParaRPr lang="en-US" dirty="0"/>
+          </a:p>
+        </p:txBody>
+      </p:sp>
+      <p:sp>
+        <p:nvSpPr>
+          <p:cNvPr id="6" name="Content Placeholder 5"/>
           <p:cNvSpPr>
             <a:spLocks noGrp="1"/>
           </p:cNvSpPr>
@@ -4524,56 +4639,75 @@
         <p:spPr/>
         <p:txBody>
           <a:bodyPr>
-            <a:normAutofit fontScale="77500" lnSpcReduction="20000"/>
+            <a:normAutofit fontScale="85000" lnSpcReduction="20000"/>
           </a:bodyPr>
           <a:lstStyle/>
           <a:p>
-            <a:pPr>
-              <a:lnSpc>
-                <a:spcPct val="110000"/>
-              </a:lnSpc>
-            </a:pPr>
-            <a:r>
-              <a:rPr lang="en-GB" dirty="0" smtClean="0"/>
-              <a:t>This extension potentially improves performance by removing some of the requirements for explicit synchronization</a:t>
-            </a:r>
-            <a:endParaRPr lang="en-GB" dirty="0"/>
-          </a:p>
-          <a:p>
-            <a:pPr>
-              <a:lnSpc>
-                <a:spcPct val="110000"/>
-              </a:lnSpc>
-            </a:pPr>
-            <a:r>
-              <a:rPr lang="en-GB" dirty="0"/>
-              <a:t>P</a:t>
-            </a:r>
-            <a:r>
-              <a:rPr lang="en-GB" dirty="0" smtClean="0"/>
-              <a:t>rovides guarantees that all pending OpenGL operations are complete upon calling </a:t>
-            </a:r>
-            <a:r>
-              <a:rPr lang="en-GB" b="1" dirty="0" err="1">
-                <a:solidFill>
-                  <a:srgbClr val="3366FF"/>
-                </a:solidFill>
-                <a:latin typeface="Courier New"/>
-                <a:cs typeface="Courier New"/>
-              </a:rPr>
-              <a:t>e</a:t>
-            </a:r>
-            <a:r>
-              <a:rPr lang="en-GB" b="1" dirty="0" err="1" smtClean="0">
-                <a:solidFill>
-                  <a:srgbClr val="3366FF"/>
-                </a:solidFill>
-                <a:latin typeface="Courier New"/>
-                <a:cs typeface="Courier New"/>
-              </a:rPr>
-              <a:t>nqueueAcquireGLObjects</a:t>
-            </a:r>
-            <a:endParaRPr lang="en-GB" b="1" dirty="0" smtClean="0">
+            <a:r>
+              <a:rPr lang="en-US" dirty="0" smtClean="0"/>
+              <a:t>There may be some platforms which do not support the </a:t>
+            </a:r>
+            <a:r>
+              <a:rPr lang="en-US" b="1" dirty="0" err="1" smtClean="0">
+                <a:solidFill>
+                  <a:srgbClr val="3366FF"/>
+                </a:solidFill>
+                <a:latin typeface="Courier New"/>
+                <a:cs typeface="Courier New"/>
+              </a:rPr>
+              <a:t>cl_khr_gl_sharing</a:t>
+            </a:r>
+            <a:r>
+              <a:rPr lang="en-US" dirty="0" smtClean="0"/>
+              <a:t> extension, but might provide </a:t>
+            </a:r>
+            <a:r>
+              <a:rPr lang="en-US" b="1" dirty="0" err="1" smtClean="0">
+                <a:solidFill>
+                  <a:srgbClr val="3366FF"/>
+                </a:solidFill>
+                <a:latin typeface="Courier New"/>
+                <a:cs typeface="Courier New"/>
+              </a:rPr>
+              <a:t>cl_khr_egl_image</a:t>
+            </a:r>
+            <a:r>
+              <a:rPr lang="en-US" dirty="0" smtClean="0"/>
+              <a:t> instead</a:t>
+            </a:r>
+          </a:p>
+          <a:p>
+            <a:r>
+              <a:rPr lang="en-US" dirty="0" smtClean="0"/>
+              <a:t>This allows an EGL image to be shared as an OpenCL image</a:t>
+            </a:r>
+          </a:p>
+          <a:p>
+            <a:r>
+              <a:rPr lang="en-US" dirty="0" smtClean="0"/>
+              <a:t>This process is similar to sharing an OpenGL texture as an OpenCL image:</a:t>
+            </a:r>
+          </a:p>
+          <a:p>
+            <a:pPr lvl="1"/>
+            <a:r>
+              <a:rPr lang="en-US" dirty="0" smtClean="0"/>
+              <a:t>No special context creation</a:t>
+            </a:r>
+          </a:p>
+          <a:p>
+            <a:pPr lvl="1"/>
+            <a:r>
+              <a:rPr lang="en-US" b="1" dirty="0" err="1" smtClean="0">
+                <a:solidFill>
+                  <a:srgbClr val="3366FF"/>
+                </a:solidFill>
+                <a:latin typeface="Courier New"/>
+                <a:cs typeface="Courier New"/>
+              </a:rPr>
+              <a:t>clCreateFromEGLImageKHR</a:t>
+            </a:r>
+            <a:endParaRPr lang="en-US" b="1" dirty="0" smtClean="0">
               <a:solidFill>
                 <a:srgbClr val="3366FF"/>
               </a:solidFill>
@@ -4582,73 +4716,74 @@
             </a:endParaRPr>
           </a:p>
           <a:p>
-            <a:pPr>
-              <a:lnSpc>
-                <a:spcPct val="110000"/>
-              </a:lnSpc>
-            </a:pPr>
-            <a:r>
-              <a:rPr lang="en-GB" dirty="0" smtClean="0"/>
-              <a:t>Provides guarantees that all pending OpenCL operations are complete upon calling </a:t>
-            </a:r>
-            <a:r>
-              <a:rPr lang="en-GB" b="1" dirty="0" err="1" smtClean="0">
-                <a:solidFill>
-                  <a:srgbClr val="3366FF"/>
-                </a:solidFill>
-                <a:latin typeface="Courier New"/>
-                <a:cs typeface="Courier New"/>
-              </a:rPr>
-              <a:t>enqueueReleaseGLObjects</a:t>
-            </a:r>
-            <a:endParaRPr lang="en-GB" dirty="0" smtClean="0"/>
-          </a:p>
-          <a:p>
-            <a:pPr>
-              <a:lnSpc>
-                <a:spcPct val="110000"/>
-              </a:lnSpc>
-            </a:pPr>
-            <a:r>
-              <a:rPr lang="en-GB" dirty="0" smtClean="0"/>
-              <a:t>A </a:t>
-            </a:r>
-            <a:r>
-              <a:rPr lang="en-GB" b="1" dirty="0" err="1" smtClean="0">
-                <a:solidFill>
-                  <a:srgbClr val="3366FF"/>
-                </a:solidFill>
-                <a:latin typeface="Courier New"/>
-                <a:cs typeface="Courier New"/>
-              </a:rPr>
-              <a:t>GL_ARB_cl_event</a:t>
-            </a:r>
-            <a:r>
-              <a:rPr lang="en-GB" dirty="0" smtClean="0"/>
-              <a:t> extension in OpenGL allows us to link </a:t>
-            </a:r>
-            <a:r>
-              <a:rPr lang="en-GB" b="1" dirty="0" smtClean="0">
-                <a:solidFill>
-                  <a:srgbClr val="3366FF"/>
-                </a:solidFill>
-                <a:latin typeface="Courier New"/>
-                <a:cs typeface="Courier New"/>
-              </a:rPr>
-              <a:t>cl::Event </a:t>
-            </a:r>
-            <a:r>
-              <a:rPr lang="en-GB" dirty="0" smtClean="0"/>
-              <a:t>objects to GL sync objects, giving us more control over the synchronization process</a:t>
-            </a:r>
-            <a:endParaRPr lang="en-GB" dirty="0"/>
+            <a:pPr lvl="1"/>
+            <a:r>
+              <a:rPr lang="en-US" b="1" dirty="0" err="1" smtClean="0">
+                <a:solidFill>
+                  <a:srgbClr val="3366FF"/>
+                </a:solidFill>
+                <a:latin typeface="Courier New"/>
+                <a:cs typeface="Courier New"/>
+              </a:rPr>
+              <a:t>clEnqueueAcquireEGLObjectsKHR</a:t>
+            </a:r>
+            <a:endParaRPr lang="en-US" b="1" dirty="0" smtClean="0">
+              <a:solidFill>
+                <a:srgbClr val="3366FF"/>
+              </a:solidFill>
+              <a:latin typeface="Courier New"/>
+              <a:cs typeface="Courier New"/>
+            </a:endParaRPr>
+          </a:p>
+          <a:p>
+            <a:pPr lvl="1"/>
+            <a:r>
+              <a:rPr lang="en-US" b="1" dirty="0" err="1" smtClean="0">
+                <a:solidFill>
+                  <a:srgbClr val="3366FF"/>
+                </a:solidFill>
+                <a:latin typeface="Courier New"/>
+                <a:cs typeface="Courier New"/>
+              </a:rPr>
+              <a:t>clEnqueueReleaseEGLObjectsKHR</a:t>
+            </a:r>
+            <a:endParaRPr lang="en-US" b="1" dirty="0" smtClean="0">
+              <a:solidFill>
+                <a:srgbClr val="3366FF"/>
+              </a:solidFill>
+              <a:latin typeface="Courier New"/>
+              <a:cs typeface="Courier New"/>
+            </a:endParaRPr>
+          </a:p>
+          <a:p>
+            <a:pPr lvl="1"/>
+            <a:r>
+              <a:rPr lang="en-US" b="1" dirty="0" err="1" smtClean="0">
+                <a:solidFill>
+                  <a:srgbClr val="3366FF"/>
+                </a:solidFill>
+                <a:latin typeface="Courier New"/>
+                <a:cs typeface="Courier New"/>
+              </a:rPr>
+              <a:t>clCreateEventFromEGLSyncKHR</a:t>
+            </a:r>
+            <a:endParaRPr lang="en-US" b="1" dirty="0" smtClean="0">
+              <a:solidFill>
+                <a:srgbClr val="3366FF"/>
+              </a:solidFill>
+              <a:latin typeface="Courier New"/>
+              <a:cs typeface="Courier New"/>
+            </a:endParaRPr>
+          </a:p>
+          <a:p>
+            <a:endParaRPr lang="en-US" dirty="0"/>
           </a:p>
         </p:txBody>
       </p:sp>
     </p:spTree>
     <p:extLst>
       <p:ext uri="{BB962C8B-B14F-4D97-AF65-F5344CB8AC3E}">
-        <p14:creationId xmlns:p14="http://schemas.microsoft.com/office/powerpoint/2010/main" val="4093567555"/>
+        <p14:creationId xmlns:p14="http://schemas.microsoft.com/office/powerpoint/2010/main" val="2578037368"/>
       </p:ext>
     </p:extLst>
   </p:cSld>
@@ -4801,14 +4936,7 @@
                 <a:latin typeface="Trebuchet MS"/>
                 <a:cs typeface="Trebuchet MS"/>
               </a:rPr>
-              <a:t>OpenCL </a:t>
-            </a:r>
-            <a:r>
-              <a:rPr lang="en-GB" smtClean="0">
-                <a:latin typeface="Trebuchet MS"/>
-                <a:cs typeface="Trebuchet MS"/>
-              </a:rPr>
-              <a:t>buffer that </a:t>
+              <a:t>OpenCL buffer that </a:t>
             </a:r>
             <a:r>
               <a:rPr lang="en-GB" dirty="0" smtClean="0">

</xml_diff>

<commit_message>
Minor tweaks to the CL/GL slides.
</commit_message>
<xml_diff>
--- a/slides/advanced_part4.pptx
+++ b/slides/advanced_part4.pptx
@@ -204,7 +204,7 @@
           <a:p>
             <a:fld id="{2E256997-BFE9-1645-ACA2-FB0069B34735}" type="datetimeFigureOut">
               <a:rPr lang="en-US" smtClean="0"/>
-              <a:t>09/05/15</a:t>
+              <a:t>10/05/15</a:t>
             </a:fld>
             <a:endParaRPr lang="en-GB"/>
           </a:p>
@@ -516,6 +516,106 @@
           <a:bodyPr/>
           <a:lstStyle/>
           <a:p>
+            <a:r>
+              <a:rPr lang="en-GB" dirty="0" smtClean="0"/>
+              <a:t>Mapped</a:t>
+            </a:r>
+            <a:r>
+              <a:rPr lang="en-GB" baseline="0" dirty="0" smtClean="0"/>
+              <a:t> approach: Need to destroy CL buffer and </a:t>
+            </a:r>
+            <a:r>
+              <a:rPr lang="en-GB" baseline="0" dirty="0" err="1" smtClean="0"/>
+              <a:t>unmap</a:t>
+            </a:r>
+            <a:r>
+              <a:rPr lang="en-GB" baseline="0" dirty="0" smtClean="0"/>
+              <a:t>, when we want to use in GL, and re-map and re-create CL buffer to use from CL again</a:t>
+            </a:r>
+            <a:endParaRPr lang="en-GB" dirty="0"/>
+          </a:p>
+        </p:txBody>
+      </p:sp>
+      <p:sp>
+        <p:nvSpPr>
+          <p:cNvPr id="4" name="Slide Number Placeholder 3"/>
+          <p:cNvSpPr>
+            <a:spLocks noGrp="1"/>
+          </p:cNvSpPr>
+          <p:nvPr>
+            <p:ph type="sldNum" sz="quarter" idx="10"/>
+          </p:nvPr>
+        </p:nvSpPr>
+        <p:spPr/>
+        <p:txBody>
+          <a:bodyPr/>
+          <a:lstStyle/>
+          <a:p>
+            <a:fld id="{FFBFF3DA-9E2F-2E43-9E31-56297DDFA94F}" type="slidenum">
+              <a:rPr lang="en-GB" smtClean="0"/>
+              <a:t>9</a:t>
+            </a:fld>
+            <a:endParaRPr lang="en-GB"/>
+          </a:p>
+        </p:txBody>
+      </p:sp>
+    </p:spTree>
+    <p:extLst>
+      <p:ext uri="{BB962C8B-B14F-4D97-AF65-F5344CB8AC3E}">
+        <p14:creationId xmlns:p14="http://schemas.microsoft.com/office/powerpoint/2010/main" val="3221772697"/>
+      </p:ext>
+    </p:extLst>
+  </p:cSld>
+  <p:clrMapOvr>
+    <a:masterClrMapping/>
+  </p:clrMapOvr>
+</p:notes>
+</file>
+
+<file path=ppt/notesSlides/notesSlide2.xml><?xml version="1.0" encoding="utf-8"?>
+<p:notes xmlns:a="http://schemas.openxmlformats.org/drawingml/2006/main" xmlns:r="http://schemas.openxmlformats.org/officeDocument/2006/relationships" xmlns:p="http://schemas.openxmlformats.org/presentationml/2006/main">
+  <p:cSld>
+    <p:spTree>
+      <p:nvGrpSpPr>
+        <p:cNvPr id="1" name=""/>
+        <p:cNvGrpSpPr/>
+        <p:nvPr/>
+      </p:nvGrpSpPr>
+      <p:grpSpPr>
+        <a:xfrm>
+          <a:off x="0" y="0"/>
+          <a:ext cx="0" cy="0"/>
+          <a:chOff x="0" y="0"/>
+          <a:chExt cx="0" cy="0"/>
+        </a:xfrm>
+      </p:grpSpPr>
+      <p:sp>
+        <p:nvSpPr>
+          <p:cNvPr id="2" name="Slide Image Placeholder 1"/>
+          <p:cNvSpPr>
+            <a:spLocks noGrp="1" noRot="1" noChangeAspect="1"/>
+          </p:cNvSpPr>
+          <p:nvPr>
+            <p:ph type="sldImg"/>
+          </p:nvPr>
+        </p:nvSpPr>
+        <p:spPr/>
+      </p:sp>
+      <p:sp>
+        <p:nvSpPr>
+          <p:cNvPr id="3" name="Notes Placeholder 2"/>
+          <p:cNvSpPr>
+            <a:spLocks noGrp="1"/>
+          </p:cNvSpPr>
+          <p:nvPr>
+            <p:ph type="body" idx="1"/>
+          </p:nvPr>
+        </p:nvSpPr>
+        <p:spPr/>
+        <p:txBody>
+          <a:bodyPr/>
+          <a:lstStyle/>
+          <a:p>
             <a:endParaRPr lang="en-GB"/>
           </a:p>
         </p:txBody>
@@ -738,7 +838,7 @@
           <a:p>
             <a:fld id="{63635F44-C3D0-2B4D-8E09-42DBC0FC5507}" type="datetimeFigureOut">
               <a:rPr lang="en-US" smtClean="0"/>
-              <a:t>09/05/15</a:t>
+              <a:t>10/05/15</a:t>
             </a:fld>
             <a:endParaRPr lang="en-GB"/>
           </a:p>
@@ -908,7 +1008,7 @@
           <a:p>
             <a:fld id="{63635F44-C3D0-2B4D-8E09-42DBC0FC5507}" type="datetimeFigureOut">
               <a:rPr lang="en-US" smtClean="0"/>
-              <a:t>09/05/15</a:t>
+              <a:t>10/05/15</a:t>
             </a:fld>
             <a:endParaRPr lang="en-GB"/>
           </a:p>
@@ -1088,7 +1188,7 @@
           <a:p>
             <a:fld id="{63635F44-C3D0-2B4D-8E09-42DBC0FC5507}" type="datetimeFigureOut">
               <a:rPr lang="en-US" smtClean="0"/>
-              <a:t>09/05/15</a:t>
+              <a:t>10/05/15</a:t>
             </a:fld>
             <a:endParaRPr lang="en-GB"/>
           </a:p>
@@ -1258,7 +1358,7 @@
           <a:p>
             <a:fld id="{63635F44-C3D0-2B4D-8E09-42DBC0FC5507}" type="datetimeFigureOut">
               <a:rPr lang="en-US" smtClean="0"/>
-              <a:t>09/05/15</a:t>
+              <a:t>10/05/15</a:t>
             </a:fld>
             <a:endParaRPr lang="en-GB"/>
           </a:p>
@@ -1504,7 +1604,7 @@
           <a:p>
             <a:fld id="{63635F44-C3D0-2B4D-8E09-42DBC0FC5507}" type="datetimeFigureOut">
               <a:rPr lang="en-US" smtClean="0"/>
-              <a:t>09/05/15</a:t>
+              <a:t>10/05/15</a:t>
             </a:fld>
             <a:endParaRPr lang="en-GB"/>
           </a:p>
@@ -1792,7 +1892,7 @@
           <a:p>
             <a:fld id="{63635F44-C3D0-2B4D-8E09-42DBC0FC5507}" type="datetimeFigureOut">
               <a:rPr lang="en-US" smtClean="0"/>
-              <a:t>09/05/15</a:t>
+              <a:t>10/05/15</a:t>
             </a:fld>
             <a:endParaRPr lang="en-GB"/>
           </a:p>
@@ -2214,7 +2314,7 @@
           <a:p>
             <a:fld id="{63635F44-C3D0-2B4D-8E09-42DBC0FC5507}" type="datetimeFigureOut">
               <a:rPr lang="en-US" smtClean="0"/>
-              <a:t>09/05/15</a:t>
+              <a:t>10/05/15</a:t>
             </a:fld>
             <a:endParaRPr lang="en-GB"/>
           </a:p>
@@ -2332,7 +2432,7 @@
           <a:p>
             <a:fld id="{63635F44-C3D0-2B4D-8E09-42DBC0FC5507}" type="datetimeFigureOut">
               <a:rPr lang="en-US" smtClean="0"/>
-              <a:t>09/05/15</a:t>
+              <a:t>10/05/15</a:t>
             </a:fld>
             <a:endParaRPr lang="en-GB"/>
           </a:p>
@@ -2427,7 +2527,7 @@
           <a:p>
             <a:fld id="{63635F44-C3D0-2B4D-8E09-42DBC0FC5507}" type="datetimeFigureOut">
               <a:rPr lang="en-US" smtClean="0"/>
-              <a:t>09/05/15</a:t>
+              <a:t>10/05/15</a:t>
             </a:fld>
             <a:endParaRPr lang="en-GB"/>
           </a:p>
@@ -2704,7 +2804,7 @@
           <a:p>
             <a:fld id="{63635F44-C3D0-2B4D-8E09-42DBC0FC5507}" type="datetimeFigureOut">
               <a:rPr lang="en-US" smtClean="0"/>
-              <a:t>09/05/15</a:t>
+              <a:t>10/05/15</a:t>
             </a:fld>
             <a:endParaRPr lang="en-GB"/>
           </a:p>
@@ -2957,7 +3057,7 @@
           <a:p>
             <a:fld id="{63635F44-C3D0-2B4D-8E09-42DBC0FC5507}" type="datetimeFigureOut">
               <a:rPr lang="en-US" smtClean="0"/>
-              <a:t>09/05/15</a:t>
+              <a:t>10/05/15</a:t>
             </a:fld>
             <a:endParaRPr lang="en-GB"/>
           </a:p>
@@ -3170,7 +3270,7 @@
           <a:p>
             <a:fld id="{63635F44-C3D0-2B4D-8E09-42DBC0FC5507}" type="datetimeFigureOut">
               <a:rPr lang="en-US" smtClean="0"/>
-              <a:t>09/05/15</a:t>
+              <a:t>10/05/15</a:t>
             </a:fld>
             <a:endParaRPr lang="en-GB"/>
           </a:p>
@@ -3895,8 +3995,8 @@
         </p:nvSpPr>
         <p:spPr>
           <a:xfrm>
-            <a:off x="4103981" y="273050"/>
-            <a:ext cx="4906888" cy="5853113"/>
+            <a:off x="4103981" y="1081436"/>
+            <a:ext cx="4906888" cy="5044727"/>
           </a:xfrm>
         </p:spPr>
         <p:txBody>
@@ -4639,7 +4739,7 @@
         <p:spPr/>
         <p:txBody>
           <a:bodyPr>
-            <a:normAutofit fontScale="85000" lnSpcReduction="20000"/>
+            <a:normAutofit fontScale="77500" lnSpcReduction="20000"/>
           </a:bodyPr>
           <a:lstStyle/>
           <a:p>
@@ -4673,8 +4773,27 @@
             </a:r>
             <a:r>
               <a:rPr lang="en-US" dirty="0" smtClean="0"/>
-              <a:t> instead</a:t>
-            </a:r>
+              <a:t> </a:t>
+            </a:r>
+            <a:r>
+              <a:rPr lang="en-US" dirty="0" smtClean="0"/>
+              <a:t>instead</a:t>
+            </a:r>
+          </a:p>
+          <a:p>
+            <a:r>
+              <a:rPr lang="en-US" dirty="0" smtClean="0"/>
+              <a:t>EGL is a </a:t>
+            </a:r>
+            <a:r>
+              <a:rPr lang="en-US" dirty="0" err="1" smtClean="0"/>
+              <a:t>Khronos</a:t>
+            </a:r>
+            <a:r>
+              <a:rPr lang="en-US" dirty="0" smtClean="0"/>
+              <a:t>-defined interface for OpenGL ES and native windowing system</a:t>
+            </a:r>
+            <a:endParaRPr lang="en-US" dirty="0" smtClean="0"/>
           </a:p>
           <a:p>
             <a:r>
@@ -4862,7 +4981,7 @@
         </p:spPr>
         <p:txBody>
           <a:bodyPr>
-            <a:normAutofit fontScale="70000" lnSpcReduction="20000"/>
+            <a:normAutofit fontScale="62500" lnSpcReduction="20000"/>
           </a:bodyPr>
           <a:lstStyle/>
           <a:p>
@@ -4887,8 +5006,19 @@
                 <a:latin typeface="Courier New"/>
                 <a:cs typeface="Courier New"/>
               </a:rPr>
-              <a:t>-GL</a:t>
-            </a:r>
+              <a:t>-</a:t>
+            </a:r>
+            <a:r>
+              <a:rPr lang="en-GB" dirty="0" smtClean="0">
+                <a:latin typeface="Courier New"/>
+                <a:cs typeface="Courier New"/>
+              </a:rPr>
+              <a:t>GL</a:t>
+            </a:r>
+            <a:endParaRPr lang="en-GB" dirty="0" smtClean="0">
+              <a:latin typeface="Courier New"/>
+              <a:cs typeface="Courier New"/>
+            </a:endParaRPr>
           </a:p>
           <a:p>
             <a:pPr lvl="1">
@@ -4929,21 +5059,28 @@
                 <a:latin typeface="Trebuchet MS"/>
                 <a:cs typeface="Trebuchet MS"/>
               </a:rPr>
-              <a:t>There is an </a:t>
-            </a:r>
-            <a:r>
-              <a:rPr lang="en-GB" smtClean="0">
-                <a:latin typeface="Trebuchet MS"/>
-                <a:cs typeface="Trebuchet MS"/>
-              </a:rPr>
-              <a:t>OpenCL buffer that </a:t>
+              <a:t>There is an OpenCL </a:t>
             </a:r>
             <a:r>
               <a:rPr lang="en-GB" dirty="0" smtClean="0">
                 <a:latin typeface="Trebuchet MS"/>
                 <a:cs typeface="Trebuchet MS"/>
               </a:rPr>
-              <a:t>is filled with pixel data, but this isn’t shared with OpenGL</a:t>
+              <a:t>image that </a:t>
+            </a:r>
+            <a:r>
+              <a:rPr lang="en-GB" dirty="0" smtClean="0">
+                <a:latin typeface="Trebuchet MS"/>
+                <a:cs typeface="Trebuchet MS"/>
+              </a:rPr>
+              <a:t>is filled with pixel data, but this isn’t shared with </a:t>
+            </a:r>
+            <a:r>
+              <a:rPr lang="en-GB" dirty="0" smtClean="0">
+                <a:latin typeface="Trebuchet MS"/>
+                <a:cs typeface="Trebuchet MS"/>
+              </a:rPr>
+              <a:t>OpenGL (yet)</a:t>
             </a:r>
           </a:p>
           <a:p>
@@ -4957,6 +5094,66 @@
                 <a:latin typeface="Trebuchet MS"/>
                 <a:cs typeface="Trebuchet MS"/>
               </a:rPr>
+              <a:t>Alternatively, work with the </a:t>
+            </a:r>
+            <a:r>
+              <a:rPr lang="en-GB" dirty="0" err="1">
+                <a:latin typeface="Courier New"/>
+                <a:cs typeface="Courier New"/>
+              </a:rPr>
+              <a:t>NBody</a:t>
+            </a:r>
+            <a:r>
+              <a:rPr lang="en-GB" dirty="0">
+                <a:latin typeface="Courier New"/>
+                <a:cs typeface="Courier New"/>
+              </a:rPr>
+              <a:t>-</a:t>
+            </a:r>
+            <a:r>
+              <a:rPr lang="en-GB" dirty="0" smtClean="0">
+                <a:latin typeface="Courier New"/>
+                <a:cs typeface="Courier New"/>
+              </a:rPr>
+              <a:t>GL-VBO</a:t>
+            </a:r>
+            <a:r>
+              <a:rPr lang="en-GB" dirty="0">
+                <a:latin typeface="Trebuchet MS"/>
+                <a:cs typeface="Trebuchet MS"/>
+              </a:rPr>
+              <a:t> </a:t>
+            </a:r>
+            <a:r>
+              <a:rPr lang="en-GB" dirty="0" smtClean="0">
+                <a:latin typeface="Trebuchet MS"/>
+                <a:cs typeface="Trebuchet MS"/>
+              </a:rPr>
+              <a:t>version, which shares the body positions as an GL vertex buffer, and </a:t>
+            </a:r>
+            <a:r>
+              <a:rPr lang="en-GB" smtClean="0">
+                <a:latin typeface="Trebuchet MS"/>
+                <a:cs typeface="Trebuchet MS"/>
+              </a:rPr>
+              <a:t>renders using GLSL</a:t>
+            </a:r>
+            <a:endParaRPr lang="en-GB" dirty="0" smtClean="0">
+              <a:latin typeface="Trebuchet MS"/>
+              <a:cs typeface="Trebuchet MS"/>
+            </a:endParaRPr>
+          </a:p>
+          <a:p>
+            <a:pPr>
+              <a:lnSpc>
+                <a:spcPct val="110000"/>
+              </a:lnSpc>
+            </a:pPr>
+            <a:r>
+              <a:rPr lang="en-GB" dirty="0" smtClean="0">
+                <a:latin typeface="Trebuchet MS"/>
+                <a:cs typeface="Trebuchet MS"/>
+              </a:rPr>
               <a:t>Your task is to modify the OpenCL code to share the GL context with CL</a:t>
             </a:r>
           </a:p>
@@ -5013,7 +5210,14 @@
                 <a:latin typeface="Trebuchet MS"/>
                 <a:cs typeface="Trebuchet MS"/>
               </a:rPr>
-              <a:t>Make it look nice!</a:t>
+              <a:t>Extra: Try and make </a:t>
+            </a:r>
+            <a:r>
+              <a:rPr lang="en-GB" dirty="0" smtClean="0">
+                <a:latin typeface="Trebuchet MS"/>
+                <a:cs typeface="Trebuchet MS"/>
+              </a:rPr>
+              <a:t>it look nice!</a:t>
             </a:r>
           </a:p>
           <a:p>
@@ -5027,7 +5231,21 @@
                 <a:latin typeface="Trebuchet MS"/>
                 <a:cs typeface="Trebuchet MS"/>
               </a:rPr>
-              <a:t>Solutions using Image/Texture Objects and Buffer/Vertex Buffer Objects will be provided</a:t>
+              <a:t>Solutions </a:t>
+            </a:r>
+            <a:r>
+              <a:rPr lang="en-GB" dirty="0" smtClean="0">
+                <a:latin typeface="Trebuchet MS"/>
+                <a:cs typeface="Trebuchet MS"/>
+              </a:rPr>
+              <a:t>are will </a:t>
+            </a:r>
+            <a:r>
+              <a:rPr lang="en-GB" dirty="0" smtClean="0">
+                <a:latin typeface="Trebuchet MS"/>
+                <a:cs typeface="Trebuchet MS"/>
+              </a:rPr>
+              <a:t>be provided</a:t>
             </a:r>
           </a:p>
         </p:txBody>

</xml_diff>

<commit_message>
Minor tweaks to CL/GL slides.
</commit_message>
<xml_diff>
--- a/slides/advanced_part4.pptx
+++ b/slides/advanced_part4.pptx
@@ -204,7 +204,7 @@
           <a:p>
             <a:fld id="{2E256997-BFE9-1645-ACA2-FB0069B34735}" type="datetimeFigureOut">
               <a:rPr lang="en-US" smtClean="0"/>
-              <a:t>10/05/15</a:t>
+              <a:t>11/05/15</a:t>
             </a:fld>
             <a:endParaRPr lang="en-GB"/>
           </a:p>
@@ -518,19 +518,21 @@
           <a:p>
             <a:r>
               <a:rPr lang="en-GB" dirty="0" smtClean="0"/>
-              <a:t>Mapped</a:t>
+              <a:t>Visualizing scientific computations</a:t>
+            </a:r>
+          </a:p>
+          <a:p>
+            <a:r>
+              <a:rPr lang="en-GB" dirty="0" smtClean="0"/>
+              <a:t>Rendering results from image processing/augmented</a:t>
             </a:r>
             <a:r>
               <a:rPr lang="en-GB" baseline="0" dirty="0" smtClean="0"/>
-              <a:t> approach: Need to destroy CL buffer and </a:t>
+              <a:t> reality </a:t>
             </a:r>
             <a:r>
               <a:rPr lang="en-GB" baseline="0" dirty="0" err="1" smtClean="0"/>
-              <a:t>unmap</a:t>
-            </a:r>
-            <a:r>
-              <a:rPr lang="en-GB" baseline="0" dirty="0" smtClean="0"/>
-              <a:t>, when we want to use in GL, and re-map and re-create CL buffer to use from CL again</a:t>
+              <a:t>etc</a:t>
             </a:r>
             <a:endParaRPr lang="en-GB" dirty="0"/>
           </a:p>
@@ -553,7 +555,7 @@
           <a:p>
             <a:fld id="{FFBFF3DA-9E2F-2E43-9E31-56297DDFA94F}" type="slidenum">
               <a:rPr lang="en-GB" smtClean="0"/>
-              <a:t>9</a:t>
+              <a:t>2</a:t>
             </a:fld>
             <a:endParaRPr lang="en-GB"/>
           </a:p>
@@ -562,7 +564,7 @@
     </p:spTree>
     <p:extLst>
       <p:ext uri="{BB962C8B-B14F-4D97-AF65-F5344CB8AC3E}">
-        <p14:creationId xmlns:p14="http://schemas.microsoft.com/office/powerpoint/2010/main" val="3221772697"/>
+        <p14:creationId xmlns:p14="http://schemas.microsoft.com/office/powerpoint/2010/main" val="1002837282"/>
       </p:ext>
     </p:extLst>
   </p:cSld>
@@ -616,7 +618,199 @@
           <a:bodyPr/>
           <a:lstStyle/>
           <a:p>
+            <a:r>
+              <a:rPr lang="en-GB" dirty="0" smtClean="0"/>
+              <a:t>We’re using SDL2</a:t>
+            </a:r>
+            <a:r>
+              <a:rPr lang="en-GB" baseline="0" dirty="0" smtClean="0"/>
+              <a:t> for the exercises</a:t>
+            </a:r>
+            <a:endParaRPr lang="en-GB" dirty="0"/>
+          </a:p>
+        </p:txBody>
+      </p:sp>
+      <p:sp>
+        <p:nvSpPr>
+          <p:cNvPr id="4" name="Slide Number Placeholder 3"/>
+          <p:cNvSpPr>
+            <a:spLocks noGrp="1"/>
+          </p:cNvSpPr>
+          <p:nvPr>
+            <p:ph type="sldNum" sz="quarter" idx="10"/>
+          </p:nvPr>
+        </p:nvSpPr>
+        <p:spPr/>
+        <p:txBody>
+          <a:bodyPr/>
+          <a:lstStyle/>
+          <a:p>
+            <a:fld id="{FFBFF3DA-9E2F-2E43-9E31-56297DDFA94F}" type="slidenum">
+              <a:rPr lang="en-GB" smtClean="0"/>
+              <a:t>4</a:t>
+            </a:fld>
             <a:endParaRPr lang="en-GB"/>
+          </a:p>
+        </p:txBody>
+      </p:sp>
+    </p:spTree>
+    <p:extLst>
+      <p:ext uri="{BB962C8B-B14F-4D97-AF65-F5344CB8AC3E}">
+        <p14:creationId xmlns:p14="http://schemas.microsoft.com/office/powerpoint/2010/main" val="1627448671"/>
+      </p:ext>
+    </p:extLst>
+  </p:cSld>
+  <p:clrMapOvr>
+    <a:masterClrMapping/>
+  </p:clrMapOvr>
+</p:notes>
+</file>
+
+<file path=ppt/notesSlides/notesSlide3.xml><?xml version="1.0" encoding="utf-8"?>
+<p:notes xmlns:a="http://schemas.openxmlformats.org/drawingml/2006/main" xmlns:r="http://schemas.openxmlformats.org/officeDocument/2006/relationships" xmlns:p="http://schemas.openxmlformats.org/presentationml/2006/main">
+  <p:cSld>
+    <p:spTree>
+      <p:nvGrpSpPr>
+        <p:cNvPr id="1" name=""/>
+        <p:cNvGrpSpPr/>
+        <p:nvPr/>
+      </p:nvGrpSpPr>
+      <p:grpSpPr>
+        <a:xfrm>
+          <a:off x="0" y="0"/>
+          <a:ext cx="0" cy="0"/>
+          <a:chOff x="0" y="0"/>
+          <a:chExt cx="0" cy="0"/>
+        </a:xfrm>
+      </p:grpSpPr>
+      <p:sp>
+        <p:nvSpPr>
+          <p:cNvPr id="2" name="Slide Image Placeholder 1"/>
+          <p:cNvSpPr>
+            <a:spLocks noGrp="1" noRot="1" noChangeAspect="1"/>
+          </p:cNvSpPr>
+          <p:nvPr>
+            <p:ph type="sldImg"/>
+          </p:nvPr>
+        </p:nvSpPr>
+        <p:spPr/>
+      </p:sp>
+      <p:sp>
+        <p:nvSpPr>
+          <p:cNvPr id="3" name="Notes Placeholder 2"/>
+          <p:cNvSpPr>
+            <a:spLocks noGrp="1"/>
+          </p:cNvSpPr>
+          <p:nvPr>
+            <p:ph type="body" idx="1"/>
+          </p:nvPr>
+        </p:nvSpPr>
+        <p:spPr/>
+        <p:txBody>
+          <a:bodyPr/>
+          <a:lstStyle/>
+          <a:p>
+            <a:r>
+              <a:rPr lang="en-GB" dirty="0" smtClean="0"/>
+              <a:t>Mapped</a:t>
+            </a:r>
+            <a:r>
+              <a:rPr lang="en-GB" baseline="0" dirty="0" smtClean="0"/>
+              <a:t> approach: Need to destroy CL buffer and </a:t>
+            </a:r>
+            <a:r>
+              <a:rPr lang="en-GB" baseline="0" dirty="0" err="1" smtClean="0"/>
+              <a:t>unmap</a:t>
+            </a:r>
+            <a:r>
+              <a:rPr lang="en-GB" baseline="0" dirty="0" smtClean="0"/>
+              <a:t>, when we want to use in GL, and re-map and re-create CL buffer to use from CL again</a:t>
+            </a:r>
+            <a:endParaRPr lang="en-GB" dirty="0"/>
+          </a:p>
+        </p:txBody>
+      </p:sp>
+      <p:sp>
+        <p:nvSpPr>
+          <p:cNvPr id="4" name="Slide Number Placeholder 3"/>
+          <p:cNvSpPr>
+            <a:spLocks noGrp="1"/>
+          </p:cNvSpPr>
+          <p:nvPr>
+            <p:ph type="sldNum" sz="quarter" idx="10"/>
+          </p:nvPr>
+        </p:nvSpPr>
+        <p:spPr/>
+        <p:txBody>
+          <a:bodyPr/>
+          <a:lstStyle/>
+          <a:p>
+            <a:fld id="{FFBFF3DA-9E2F-2E43-9E31-56297DDFA94F}" type="slidenum">
+              <a:rPr lang="en-GB" smtClean="0"/>
+              <a:t>9</a:t>
+            </a:fld>
+            <a:endParaRPr lang="en-GB"/>
+          </a:p>
+        </p:txBody>
+      </p:sp>
+    </p:spTree>
+    <p:extLst>
+      <p:ext uri="{BB962C8B-B14F-4D97-AF65-F5344CB8AC3E}">
+        <p14:creationId xmlns:p14="http://schemas.microsoft.com/office/powerpoint/2010/main" val="3221772697"/>
+      </p:ext>
+    </p:extLst>
+  </p:cSld>
+  <p:clrMapOvr>
+    <a:masterClrMapping/>
+  </p:clrMapOvr>
+</p:notes>
+</file>
+
+<file path=ppt/notesSlides/notesSlide4.xml><?xml version="1.0" encoding="utf-8"?>
+<p:notes xmlns:a="http://schemas.openxmlformats.org/drawingml/2006/main" xmlns:r="http://schemas.openxmlformats.org/officeDocument/2006/relationships" xmlns:p="http://schemas.openxmlformats.org/presentationml/2006/main">
+  <p:cSld>
+    <p:spTree>
+      <p:nvGrpSpPr>
+        <p:cNvPr id="1" name=""/>
+        <p:cNvGrpSpPr/>
+        <p:nvPr/>
+      </p:nvGrpSpPr>
+      <p:grpSpPr>
+        <a:xfrm>
+          <a:off x="0" y="0"/>
+          <a:ext cx="0" cy="0"/>
+          <a:chOff x="0" y="0"/>
+          <a:chExt cx="0" cy="0"/>
+        </a:xfrm>
+      </p:grpSpPr>
+      <p:sp>
+        <p:nvSpPr>
+          <p:cNvPr id="2" name="Slide Image Placeholder 1"/>
+          <p:cNvSpPr>
+            <a:spLocks noGrp="1" noRot="1" noChangeAspect="1"/>
+          </p:cNvSpPr>
+          <p:nvPr>
+            <p:ph type="sldImg"/>
+          </p:nvPr>
+        </p:nvSpPr>
+        <p:spPr/>
+      </p:sp>
+      <p:sp>
+        <p:nvSpPr>
+          <p:cNvPr id="3" name="Notes Placeholder 2"/>
+          <p:cNvSpPr>
+            <a:spLocks noGrp="1"/>
+          </p:cNvSpPr>
+          <p:nvPr>
+            <p:ph type="body" idx="1"/>
+          </p:nvPr>
+        </p:nvSpPr>
+        <p:spPr/>
+        <p:txBody>
+          <a:bodyPr/>
+          <a:lstStyle/>
+          <a:p>
+            <a:endParaRPr lang="en-GB" dirty="0"/>
           </a:p>
         </p:txBody>
       </p:sp>
@@ -648,6 +842,190 @@
     <p:extLst>
       <p:ext uri="{BB962C8B-B14F-4D97-AF65-F5344CB8AC3E}">
         <p14:creationId xmlns:p14="http://schemas.microsoft.com/office/powerpoint/2010/main" val="2197591621"/>
+      </p:ext>
+    </p:extLst>
+  </p:cSld>
+  <p:clrMapOvr>
+    <a:masterClrMapping/>
+  </p:clrMapOvr>
+</p:notes>
+</file>
+
+<file path=ppt/notesSlides/notesSlide5.xml><?xml version="1.0" encoding="utf-8"?>
+<p:notes xmlns:a="http://schemas.openxmlformats.org/drawingml/2006/main" xmlns:r="http://schemas.openxmlformats.org/officeDocument/2006/relationships" xmlns:p="http://schemas.openxmlformats.org/presentationml/2006/main">
+  <p:cSld>
+    <p:spTree>
+      <p:nvGrpSpPr>
+        <p:cNvPr id="1" name=""/>
+        <p:cNvGrpSpPr/>
+        <p:nvPr/>
+      </p:nvGrpSpPr>
+      <p:grpSpPr>
+        <a:xfrm>
+          <a:off x="0" y="0"/>
+          <a:ext cx="0" cy="0"/>
+          <a:chOff x="0" y="0"/>
+          <a:chExt cx="0" cy="0"/>
+        </a:xfrm>
+      </p:grpSpPr>
+      <p:sp>
+        <p:nvSpPr>
+          <p:cNvPr id="2" name="Slide Image Placeholder 1"/>
+          <p:cNvSpPr>
+            <a:spLocks noGrp="1" noRot="1" noChangeAspect="1"/>
+          </p:cNvSpPr>
+          <p:nvPr>
+            <p:ph type="sldImg"/>
+          </p:nvPr>
+        </p:nvSpPr>
+        <p:spPr/>
+      </p:sp>
+      <p:sp>
+        <p:nvSpPr>
+          <p:cNvPr id="3" name="Notes Placeholder 2"/>
+          <p:cNvSpPr>
+            <a:spLocks noGrp="1"/>
+          </p:cNvSpPr>
+          <p:nvPr>
+            <p:ph type="body" idx="1"/>
+          </p:nvPr>
+        </p:nvSpPr>
+        <p:spPr/>
+        <p:txBody>
+          <a:bodyPr/>
+          <a:lstStyle/>
+          <a:p>
+            <a:r>
+              <a:rPr lang="en-GB" dirty="0" smtClean="0"/>
+              <a:t>Can provide a zero-copy path between camera-&gt;compute-&gt;rendering on mobile platforms</a:t>
+            </a:r>
+            <a:endParaRPr lang="en-GB" dirty="0"/>
+          </a:p>
+        </p:txBody>
+      </p:sp>
+      <p:sp>
+        <p:nvSpPr>
+          <p:cNvPr id="4" name="Slide Number Placeholder 3"/>
+          <p:cNvSpPr>
+            <a:spLocks noGrp="1"/>
+          </p:cNvSpPr>
+          <p:nvPr>
+            <p:ph type="sldNum" sz="quarter" idx="10"/>
+          </p:nvPr>
+        </p:nvSpPr>
+        <p:spPr/>
+        <p:txBody>
+          <a:bodyPr/>
+          <a:lstStyle/>
+          <a:p>
+            <a:fld id="{FFBFF3DA-9E2F-2E43-9E31-56297DDFA94F}" type="slidenum">
+              <a:rPr lang="en-GB" smtClean="0"/>
+              <a:t>12</a:t>
+            </a:fld>
+            <a:endParaRPr lang="en-GB"/>
+          </a:p>
+        </p:txBody>
+      </p:sp>
+    </p:spTree>
+    <p:extLst>
+      <p:ext uri="{BB962C8B-B14F-4D97-AF65-F5344CB8AC3E}">
+        <p14:creationId xmlns:p14="http://schemas.microsoft.com/office/powerpoint/2010/main" val="918713682"/>
+      </p:ext>
+    </p:extLst>
+  </p:cSld>
+  <p:clrMapOvr>
+    <a:masterClrMapping/>
+  </p:clrMapOvr>
+</p:notes>
+</file>
+
+<file path=ppt/notesSlides/notesSlide6.xml><?xml version="1.0" encoding="utf-8"?>
+<p:notes xmlns:a="http://schemas.openxmlformats.org/drawingml/2006/main" xmlns:r="http://schemas.openxmlformats.org/officeDocument/2006/relationships" xmlns:p="http://schemas.openxmlformats.org/presentationml/2006/main">
+  <p:cSld>
+    <p:spTree>
+      <p:nvGrpSpPr>
+        <p:cNvPr id="1" name=""/>
+        <p:cNvGrpSpPr/>
+        <p:nvPr/>
+      </p:nvGrpSpPr>
+      <p:grpSpPr>
+        <a:xfrm>
+          <a:off x="0" y="0"/>
+          <a:ext cx="0" cy="0"/>
+          <a:chOff x="0" y="0"/>
+          <a:chExt cx="0" cy="0"/>
+        </a:xfrm>
+      </p:grpSpPr>
+      <p:sp>
+        <p:nvSpPr>
+          <p:cNvPr id="2" name="Slide Image Placeholder 1"/>
+          <p:cNvSpPr>
+            <a:spLocks noGrp="1" noRot="1" noChangeAspect="1"/>
+          </p:cNvSpPr>
+          <p:nvPr>
+            <p:ph type="sldImg"/>
+          </p:nvPr>
+        </p:nvSpPr>
+        <p:spPr/>
+      </p:sp>
+      <p:sp>
+        <p:nvSpPr>
+          <p:cNvPr id="3" name="Notes Placeholder 2"/>
+          <p:cNvSpPr>
+            <a:spLocks noGrp="1"/>
+          </p:cNvSpPr>
+          <p:nvPr>
+            <p:ph type="body" idx="1"/>
+          </p:nvPr>
+        </p:nvSpPr>
+        <p:spPr/>
+        <p:txBody>
+          <a:bodyPr/>
+          <a:lstStyle/>
+          <a:p>
+            <a:r>
+              <a:rPr lang="en-GB" dirty="0" smtClean="0"/>
+              <a:t>Needs</a:t>
+            </a:r>
+            <a:r>
+              <a:rPr lang="en-GB" baseline="0" dirty="0" smtClean="0"/>
+              <a:t> to </a:t>
+            </a:r>
+            <a:r>
+              <a:rPr lang="en-GB" baseline="0" smtClean="0"/>
+              <a:t>run locally</a:t>
+            </a:r>
+            <a:endParaRPr lang="en-GB"/>
+          </a:p>
+        </p:txBody>
+      </p:sp>
+      <p:sp>
+        <p:nvSpPr>
+          <p:cNvPr id="4" name="Slide Number Placeholder 3"/>
+          <p:cNvSpPr>
+            <a:spLocks noGrp="1"/>
+          </p:cNvSpPr>
+          <p:nvPr>
+            <p:ph type="sldNum" sz="quarter" idx="10"/>
+          </p:nvPr>
+        </p:nvSpPr>
+        <p:spPr/>
+        <p:txBody>
+          <a:bodyPr/>
+          <a:lstStyle/>
+          <a:p>
+            <a:fld id="{FFBFF3DA-9E2F-2E43-9E31-56297DDFA94F}" type="slidenum">
+              <a:rPr lang="en-GB" smtClean="0"/>
+              <a:t>13</a:t>
+            </a:fld>
+            <a:endParaRPr lang="en-GB"/>
+          </a:p>
+        </p:txBody>
+      </p:sp>
+    </p:spTree>
+    <p:extLst>
+      <p:ext uri="{BB962C8B-B14F-4D97-AF65-F5344CB8AC3E}">
+        <p14:creationId xmlns:p14="http://schemas.microsoft.com/office/powerpoint/2010/main" val="2599729644"/>
       </p:ext>
     </p:extLst>
   </p:cSld>
@@ -838,7 +1216,7 @@
           <a:p>
             <a:fld id="{63635F44-C3D0-2B4D-8E09-42DBC0FC5507}" type="datetimeFigureOut">
               <a:rPr lang="en-US" smtClean="0"/>
-              <a:t>10/05/15</a:t>
+              <a:t>11/05/15</a:t>
             </a:fld>
             <a:endParaRPr lang="en-GB"/>
           </a:p>
@@ -1008,7 +1386,7 @@
           <a:p>
             <a:fld id="{63635F44-C3D0-2B4D-8E09-42DBC0FC5507}" type="datetimeFigureOut">
               <a:rPr lang="en-US" smtClean="0"/>
-              <a:t>10/05/15</a:t>
+              <a:t>11/05/15</a:t>
             </a:fld>
             <a:endParaRPr lang="en-GB"/>
           </a:p>
@@ -1188,7 +1566,7 @@
           <a:p>
             <a:fld id="{63635F44-C3D0-2B4D-8E09-42DBC0FC5507}" type="datetimeFigureOut">
               <a:rPr lang="en-US" smtClean="0"/>
-              <a:t>10/05/15</a:t>
+              <a:t>11/05/15</a:t>
             </a:fld>
             <a:endParaRPr lang="en-GB"/>
           </a:p>
@@ -1358,7 +1736,7 @@
           <a:p>
             <a:fld id="{63635F44-C3D0-2B4D-8E09-42DBC0FC5507}" type="datetimeFigureOut">
               <a:rPr lang="en-US" smtClean="0"/>
-              <a:t>10/05/15</a:t>
+              <a:t>11/05/15</a:t>
             </a:fld>
             <a:endParaRPr lang="en-GB"/>
           </a:p>
@@ -1604,7 +1982,7 @@
           <a:p>
             <a:fld id="{63635F44-C3D0-2B4D-8E09-42DBC0FC5507}" type="datetimeFigureOut">
               <a:rPr lang="en-US" smtClean="0"/>
-              <a:t>10/05/15</a:t>
+              <a:t>11/05/15</a:t>
             </a:fld>
             <a:endParaRPr lang="en-GB"/>
           </a:p>
@@ -1892,7 +2270,7 @@
           <a:p>
             <a:fld id="{63635F44-C3D0-2B4D-8E09-42DBC0FC5507}" type="datetimeFigureOut">
               <a:rPr lang="en-US" smtClean="0"/>
-              <a:t>10/05/15</a:t>
+              <a:t>11/05/15</a:t>
             </a:fld>
             <a:endParaRPr lang="en-GB"/>
           </a:p>
@@ -2314,7 +2692,7 @@
           <a:p>
             <a:fld id="{63635F44-C3D0-2B4D-8E09-42DBC0FC5507}" type="datetimeFigureOut">
               <a:rPr lang="en-US" smtClean="0"/>
-              <a:t>10/05/15</a:t>
+              <a:t>11/05/15</a:t>
             </a:fld>
             <a:endParaRPr lang="en-GB"/>
           </a:p>
@@ -2432,7 +2810,7 @@
           <a:p>
             <a:fld id="{63635F44-C3D0-2B4D-8E09-42DBC0FC5507}" type="datetimeFigureOut">
               <a:rPr lang="en-US" smtClean="0"/>
-              <a:t>10/05/15</a:t>
+              <a:t>11/05/15</a:t>
             </a:fld>
             <a:endParaRPr lang="en-GB"/>
           </a:p>
@@ -2527,7 +2905,7 @@
           <a:p>
             <a:fld id="{63635F44-C3D0-2B4D-8E09-42DBC0FC5507}" type="datetimeFigureOut">
               <a:rPr lang="en-US" smtClean="0"/>
-              <a:t>10/05/15</a:t>
+              <a:t>11/05/15</a:t>
             </a:fld>
             <a:endParaRPr lang="en-GB"/>
           </a:p>
@@ -2804,7 +3182,7 @@
           <a:p>
             <a:fld id="{63635F44-C3D0-2B4D-8E09-42DBC0FC5507}" type="datetimeFigureOut">
               <a:rPr lang="en-US" smtClean="0"/>
-              <a:t>10/05/15</a:t>
+              <a:t>11/05/15</a:t>
             </a:fld>
             <a:endParaRPr lang="en-GB"/>
           </a:p>
@@ -3057,7 +3435,7 @@
           <a:p>
             <a:fld id="{63635F44-C3D0-2B4D-8E09-42DBC0FC5507}" type="datetimeFigureOut">
               <a:rPr lang="en-US" smtClean="0"/>
-              <a:t>10/05/15</a:t>
+              <a:t>11/05/15</a:t>
             </a:fld>
             <a:endParaRPr lang="en-GB"/>
           </a:p>
@@ -3270,7 +3648,7 @@
           <a:p>
             <a:fld id="{63635F44-C3D0-2B4D-8E09-42DBC0FC5507}" type="datetimeFigureOut">
               <a:rPr lang="en-US" smtClean="0"/>
-              <a:t>10/05/15</a:t>
+              <a:t>11/05/15</a:t>
             </a:fld>
             <a:endParaRPr lang="en-GB"/>
           </a:p>
@@ -4545,7 +4923,7 @@
         <p:spPr/>
         <p:txBody>
           <a:bodyPr>
-            <a:normAutofit fontScale="77500" lnSpcReduction="20000"/>
+            <a:normAutofit fontScale="70000" lnSpcReduction="20000"/>
           </a:bodyPr>
           <a:lstStyle/>
           <a:p>
@@ -4622,7 +5000,13 @@
               </a:rPr>
               <a:t>enqueueReleaseGLObjects</a:t>
             </a:r>
-            <a:endParaRPr lang="en-GB" dirty="0" smtClean="0"/>
+            <a:endParaRPr lang="en-GB" b="1" dirty="0" smtClean="0">
+              <a:solidFill>
+                <a:srgbClr val="3366FF"/>
+              </a:solidFill>
+              <a:latin typeface="Courier New"/>
+              <a:cs typeface="Courier New"/>
+            </a:endParaRPr>
           </a:p>
           <a:p>
             <a:pPr>
@@ -4632,7 +5016,83 @@
             </a:pPr>
             <a:r>
               <a:rPr lang="en-GB" dirty="0" smtClean="0"/>
-              <a:t>A </a:t>
+              <a:t>Also allows </a:t>
+            </a:r>
+            <a:r>
+              <a:rPr lang="en-GB" dirty="0"/>
+              <a:t>us to </a:t>
+            </a:r>
+            <a:r>
+              <a:rPr lang="en-GB" dirty="0" smtClean="0"/>
+              <a:t>create </a:t>
+            </a:r>
+            <a:r>
+              <a:rPr lang="en-GB" b="1" dirty="0" smtClean="0">
+                <a:solidFill>
+                  <a:srgbClr val="3366FF"/>
+                </a:solidFill>
+                <a:latin typeface="Courier New"/>
+                <a:cs typeface="Courier New"/>
+              </a:rPr>
+              <a:t>cl</a:t>
+            </a:r>
+            <a:r>
+              <a:rPr lang="en-GB" b="1" dirty="0">
+                <a:solidFill>
+                  <a:srgbClr val="3366FF"/>
+                </a:solidFill>
+                <a:latin typeface="Courier New"/>
+                <a:cs typeface="Courier New"/>
+              </a:rPr>
+              <a:t>::</a:t>
+            </a:r>
+            <a:r>
+              <a:rPr lang="en-GB" b="1" dirty="0" smtClean="0">
+                <a:solidFill>
+                  <a:srgbClr val="3366FF"/>
+                </a:solidFill>
+                <a:latin typeface="Courier New"/>
+                <a:cs typeface="Courier New"/>
+              </a:rPr>
+              <a:t>Event</a:t>
+            </a:r>
+            <a:r>
+              <a:rPr lang="en-GB" b="1" dirty="0" smtClean="0">
+                <a:solidFill>
+                  <a:srgbClr val="3366FF"/>
+                </a:solidFill>
+                <a:latin typeface="Calibri New"/>
+                <a:cs typeface="Calibri New"/>
+              </a:rPr>
+              <a:t> </a:t>
+            </a:r>
+            <a:r>
+              <a:rPr lang="en-GB" dirty="0"/>
+              <a:t>objects </a:t>
+            </a:r>
+            <a:r>
+              <a:rPr lang="en-GB" dirty="0" smtClean="0"/>
+              <a:t>from GL </a:t>
+            </a:r>
+            <a:r>
+              <a:rPr lang="en-GB" dirty="0"/>
+              <a:t>sync objects, giving us more control over the synchronization </a:t>
+            </a:r>
+            <a:r>
+              <a:rPr lang="en-GB" dirty="0" smtClean="0"/>
+              <a:t>process</a:t>
+            </a:r>
+            <a:endParaRPr lang="en-GB" dirty="0" smtClean="0"/>
+          </a:p>
+          <a:p>
+            <a:pPr>
+              <a:lnSpc>
+                <a:spcPct val="110000"/>
+              </a:lnSpc>
+            </a:pPr>
+            <a:r>
+              <a:rPr lang="en-GB" dirty="0" smtClean="0"/>
+              <a:t>A related </a:t>
             </a:r>
             <a:r>
               <a:rPr lang="en-GB" b="1" dirty="0" err="1" smtClean="0">
@@ -4646,7 +5106,11 @@
             </a:r>
             <a:r>
               <a:rPr lang="en-GB" dirty="0" smtClean="0"/>
-              <a:t> extension in OpenGL allows us to link </a:t>
+              <a:t> extension in OpenGL allows us to </a:t>
+            </a:r>
+            <a:r>
+              <a:rPr lang="en-GB" dirty="0" smtClean="0"/>
+              <a:t>create GL sync objects from </a:t>
             </a:r>
             <a:r>
               <a:rPr lang="en-GB" b="1" dirty="0" smtClean="0">
@@ -4656,11 +5120,31 @@
                 <a:latin typeface="Courier New"/>
                 <a:cs typeface="Courier New"/>
               </a:rPr>
-              <a:t>cl::Event </a:t>
+              <a:t>cl</a:t>
+            </a:r>
+            <a:r>
+              <a:rPr lang="en-GB" b="1" dirty="0" smtClean="0">
+                <a:solidFill>
+                  <a:srgbClr val="3366FF"/>
+                </a:solidFill>
+                <a:latin typeface="Courier New"/>
+                <a:cs typeface="Courier New"/>
+              </a:rPr>
+              <a:t>::</a:t>
+            </a:r>
+            <a:r>
+              <a:rPr lang="en-GB" b="1" dirty="0" smtClean="0">
+                <a:solidFill>
+                  <a:srgbClr val="3366FF"/>
+                </a:solidFill>
+                <a:latin typeface="Courier New"/>
+                <a:cs typeface="Courier New"/>
+              </a:rPr>
+              <a:t>Event</a:t>
             </a:r>
             <a:r>
               <a:rPr lang="en-GB" dirty="0" smtClean="0"/>
-              <a:t>objects to GL sync objects, giving us more control over the synchronization process</a:t>
+              <a:t> objects</a:t>
             </a:r>
             <a:endParaRPr lang="en-GB" dirty="0"/>
           </a:p>
@@ -4773,11 +5257,7 @@
             </a:r>
             <a:r>
               <a:rPr lang="en-US" dirty="0" smtClean="0"/>
-              <a:t> </a:t>
-            </a:r>
-            <a:r>
-              <a:rPr lang="en-US" dirty="0" smtClean="0"/>
-              <a:t>instead</a:t>
+              <a:t> instead</a:t>
             </a:r>
           </a:p>
           <a:p>
@@ -4791,9 +5271,24 @@
             </a:r>
             <a:r>
               <a:rPr lang="en-US" dirty="0" smtClean="0"/>
-              <a:t>-defined interface for OpenGL ES and native windowing system</a:t>
-            </a:r>
-            <a:endParaRPr lang="en-US" dirty="0" smtClean="0"/>
+              <a:t>-defined interface </a:t>
+            </a:r>
+            <a:r>
+              <a:rPr lang="en-US" dirty="0" smtClean="0"/>
+              <a:t>between OpenGL </a:t>
+            </a:r>
+            <a:r>
+              <a:rPr lang="en-US" dirty="0" smtClean="0"/>
+              <a:t>ES and </a:t>
+            </a:r>
+            <a:r>
+              <a:rPr lang="en-US" dirty="0" smtClean="0"/>
+              <a:t>the native </a:t>
+            </a:r>
+            <a:r>
+              <a:rPr lang="en-US" dirty="0" smtClean="0"/>
+              <a:t>windowing system</a:t>
+            </a:r>
           </a:p>
           <a:p>
             <a:r>
@@ -5006,19 +5501,8 @@
                 <a:latin typeface="Courier New"/>
                 <a:cs typeface="Courier New"/>
               </a:rPr>
-              <a:t>-</a:t>
-            </a:r>
-            <a:r>
-              <a:rPr lang="en-GB" dirty="0" smtClean="0">
-                <a:latin typeface="Courier New"/>
-                <a:cs typeface="Courier New"/>
-              </a:rPr>
-              <a:t>GL</a:t>
-            </a:r>
-            <a:endParaRPr lang="en-GB" dirty="0" smtClean="0">
-              <a:latin typeface="Courier New"/>
-              <a:cs typeface="Courier New"/>
-            </a:endParaRPr>
+              <a:t>-GL</a:t>
+            </a:r>
           </a:p>
           <a:p>
             <a:pPr lvl="1">
@@ -5059,28 +5543,7 @@
                 <a:latin typeface="Trebuchet MS"/>
                 <a:cs typeface="Trebuchet MS"/>
               </a:rPr>
-              <a:t>There is an OpenCL </a:t>
-            </a:r>
-            <a:r>
-              <a:rPr lang="en-GB" dirty="0" smtClean="0">
-                <a:latin typeface="Trebuchet MS"/>
-                <a:cs typeface="Trebuchet MS"/>
-              </a:rPr>
-              <a:t>image that </a:t>
-            </a:r>
-            <a:r>
-              <a:rPr lang="en-GB" dirty="0" smtClean="0">
-                <a:latin typeface="Trebuchet MS"/>
-                <a:cs typeface="Trebuchet MS"/>
-              </a:rPr>
-              <a:t>is filled with pixel data, but this isn’t shared with </a:t>
-            </a:r>
-            <a:r>
-              <a:rPr lang="en-GB" dirty="0" smtClean="0">
-                <a:latin typeface="Trebuchet MS"/>
-                <a:cs typeface="Trebuchet MS"/>
-              </a:rPr>
-              <a:t>OpenGL (yet)</a:t>
+              <a:t>There is an OpenCL image that is filled with pixel data, but this isn’t shared with OpenGL (yet)</a:t>
             </a:r>
           </a:p>
           <a:p>
@@ -5210,14 +5673,7 @@
                 <a:latin typeface="Trebuchet MS"/>
                 <a:cs typeface="Trebuchet MS"/>
               </a:rPr>
-              <a:t>Extra: Try and make </a:t>
-            </a:r>
-            <a:r>
-              <a:rPr lang="en-GB" dirty="0" smtClean="0">
-                <a:latin typeface="Trebuchet MS"/>
-                <a:cs typeface="Trebuchet MS"/>
-              </a:rPr>
-              <a:t>it look nice!</a:t>
+              <a:t>Extra: Try and make it look nice!</a:t>
             </a:r>
           </a:p>
           <a:p>
@@ -5231,21 +5687,7 @@
                 <a:latin typeface="Trebuchet MS"/>
                 <a:cs typeface="Trebuchet MS"/>
               </a:rPr>
-              <a:t>Solutions </a:t>
-            </a:r>
-            <a:r>
-              <a:rPr lang="en-GB" dirty="0" smtClean="0">
-                <a:latin typeface="Trebuchet MS"/>
-                <a:cs typeface="Trebuchet MS"/>
-              </a:rPr>
-              <a:t>are will </a:t>
-            </a:r>
-            <a:r>
-              <a:rPr lang="en-GB" dirty="0" smtClean="0">
-                <a:latin typeface="Trebuchet MS"/>
-                <a:cs typeface="Trebuchet MS"/>
-              </a:rPr>
-              <a:t>be provided</a:t>
+              <a:t>Solutions are will be provided</a:t>
             </a:r>
           </a:p>
         </p:txBody>
@@ -5360,7 +5802,7 @@
           <p:nvPr/>
         </p:nvPicPr>
         <p:blipFill>
-          <a:blip r:embed="rId2"/>
+          <a:blip r:embed="rId3"/>
           <a:stretch>
             <a:fillRect/>
           </a:stretch>
@@ -5384,7 +5826,7 @@
           <p:nvPr/>
         </p:nvPicPr>
         <p:blipFill>
-          <a:blip r:embed="rId3"/>
+          <a:blip r:embed="rId4"/>
           <a:stretch>
             <a:fillRect/>
           </a:stretch>
@@ -5659,7 +6101,7 @@
           <p:nvPr/>
         </p:nvPicPr>
         <p:blipFill>
-          <a:blip r:embed="rId2"/>
+          <a:blip r:embed="rId3"/>
           <a:stretch>
             <a:fillRect/>
           </a:stretch>

</xml_diff>